<commit_message>
updated presentation and added dummy demo class
</commit_message>
<xml_diff>
--- a/presentation.pptx
+++ b/presentation.pptx
@@ -5,7 +5,7 @@
     <p:sldMasterId id="2147483803" r:id="rId1"/>
   </p:sldMasterIdLst>
   <p:notesMasterIdLst>
-    <p:notesMasterId r:id="rId12"/>
+    <p:notesMasterId r:id="rId17"/>
   </p:notesMasterIdLst>
   <p:sldIdLst>
     <p:sldId id="265" r:id="rId2"/>
@@ -18,6 +18,11 @@
     <p:sldId id="262" r:id="rId9"/>
     <p:sldId id="261" r:id="rId10"/>
     <p:sldId id="264" r:id="rId11"/>
+    <p:sldId id="266" r:id="rId12"/>
+    <p:sldId id="267" r:id="rId13"/>
+    <p:sldId id="268" r:id="rId14"/>
+    <p:sldId id="269" r:id="rId15"/>
+    <p:sldId id="270" r:id="rId16"/>
   </p:sldIdLst>
   <p:sldSz cx="12192000" cy="6858000"/>
   <p:notesSz cx="6858000" cy="9144000"/>
@@ -116,6 +121,11 @@
       </a:defRPr>
     </a:lvl9pPr>
   </p:defaultTextStyle>
+  <p:extLst>
+    <p:ext uri="{EFAFB233-063F-42B5-8137-9DF3F51BA10A}">
+      <p15:sldGuideLst xmlns:p15="http://schemas.microsoft.com/office/powerpoint/2012/main"/>
+    </p:ext>
+  </p:extLst>
 </p:presentation>
 </file>
 
@@ -201,7 +211,7 @@
           <a:p>
             <a:fld id="{6BAB3C7C-4B69-408A-993B-D066D2C2EC10}" type="datetimeFigureOut">
               <a:rPr lang="ru-RU" smtClean="0"/>
-              <a:t>25.04.2018</a:t>
+              <a:t>27.04.2018</a:t>
             </a:fld>
             <a:endParaRPr lang="ru-RU"/>
           </a:p>
@@ -1695,6 +1705,258 @@
 </p:notes>
 </file>
 
+<file path=ppt/notesSlides/notesSlide3.xml><?xml version="1.0" encoding="utf-8"?>
+<p:notes xmlns:a="http://schemas.openxmlformats.org/drawingml/2006/main" xmlns:r="http://schemas.openxmlformats.org/officeDocument/2006/relationships" xmlns:p="http://schemas.openxmlformats.org/presentationml/2006/main">
+  <p:cSld>
+    <p:spTree>
+      <p:nvGrpSpPr>
+        <p:cNvPr id="1" name=""/>
+        <p:cNvGrpSpPr/>
+        <p:nvPr/>
+      </p:nvGrpSpPr>
+      <p:grpSpPr>
+        <a:xfrm>
+          <a:off x="0" y="0"/>
+          <a:ext cx="0" cy="0"/>
+          <a:chOff x="0" y="0"/>
+          <a:chExt cx="0" cy="0"/>
+        </a:xfrm>
+      </p:grpSpPr>
+      <p:sp>
+        <p:nvSpPr>
+          <p:cNvPr id="2" name="Образ слайда 1"/>
+          <p:cNvSpPr>
+            <a:spLocks noGrp="1" noRot="1" noChangeAspect="1"/>
+          </p:cNvSpPr>
+          <p:nvPr>
+            <p:ph type="sldImg"/>
+          </p:nvPr>
+        </p:nvSpPr>
+        <p:spPr/>
+      </p:sp>
+      <p:sp>
+        <p:nvSpPr>
+          <p:cNvPr id="3" name="Заметки 2"/>
+          <p:cNvSpPr>
+            <a:spLocks noGrp="1"/>
+          </p:cNvSpPr>
+          <p:nvPr>
+            <p:ph type="body" idx="1"/>
+          </p:nvPr>
+        </p:nvSpPr>
+        <p:spPr/>
+        <p:txBody>
+          <a:bodyPr/>
+          <a:lstStyle/>
+          <a:p>
+            <a:endParaRPr lang="ru-RU" dirty="0"/>
+          </a:p>
+        </p:txBody>
+      </p:sp>
+      <p:sp>
+        <p:nvSpPr>
+          <p:cNvPr id="4" name="Номер слайда 3"/>
+          <p:cNvSpPr>
+            <a:spLocks noGrp="1"/>
+          </p:cNvSpPr>
+          <p:nvPr>
+            <p:ph type="sldNum" sz="quarter" idx="10"/>
+          </p:nvPr>
+        </p:nvSpPr>
+        <p:spPr/>
+        <p:txBody>
+          <a:bodyPr/>
+          <a:lstStyle/>
+          <a:p>
+            <a:fld id="{B1C259BB-3010-4D83-AB37-352EA0165011}" type="slidenum">
+              <a:rPr lang="ru-RU" smtClean="0"/>
+              <a:t>11</a:t>
+            </a:fld>
+            <a:endParaRPr lang="ru-RU"/>
+          </a:p>
+        </p:txBody>
+      </p:sp>
+    </p:spTree>
+    <p:extLst>
+      <p:ext uri="{BB962C8B-B14F-4D97-AF65-F5344CB8AC3E}">
+        <p14:creationId xmlns:p14="http://schemas.microsoft.com/office/powerpoint/2010/main" val="2863239680"/>
+      </p:ext>
+    </p:extLst>
+  </p:cSld>
+  <p:clrMapOvr>
+    <a:masterClrMapping/>
+  </p:clrMapOvr>
+</p:notes>
+</file>
+
+<file path=ppt/notesSlides/notesSlide4.xml><?xml version="1.0" encoding="utf-8"?>
+<p:notes xmlns:a="http://schemas.openxmlformats.org/drawingml/2006/main" xmlns:r="http://schemas.openxmlformats.org/officeDocument/2006/relationships" xmlns:p="http://schemas.openxmlformats.org/presentationml/2006/main">
+  <p:cSld>
+    <p:spTree>
+      <p:nvGrpSpPr>
+        <p:cNvPr id="1" name=""/>
+        <p:cNvGrpSpPr/>
+        <p:nvPr/>
+      </p:nvGrpSpPr>
+      <p:grpSpPr>
+        <a:xfrm>
+          <a:off x="0" y="0"/>
+          <a:ext cx="0" cy="0"/>
+          <a:chOff x="0" y="0"/>
+          <a:chExt cx="0" cy="0"/>
+        </a:xfrm>
+      </p:grpSpPr>
+      <p:sp>
+        <p:nvSpPr>
+          <p:cNvPr id="2" name="Образ слайда 1"/>
+          <p:cNvSpPr>
+            <a:spLocks noGrp="1" noRot="1" noChangeAspect="1"/>
+          </p:cNvSpPr>
+          <p:nvPr>
+            <p:ph type="sldImg"/>
+          </p:nvPr>
+        </p:nvSpPr>
+        <p:spPr/>
+      </p:sp>
+      <p:sp>
+        <p:nvSpPr>
+          <p:cNvPr id="3" name="Заметки 2"/>
+          <p:cNvSpPr>
+            <a:spLocks noGrp="1"/>
+          </p:cNvSpPr>
+          <p:nvPr>
+            <p:ph type="body" idx="1"/>
+          </p:nvPr>
+        </p:nvSpPr>
+        <p:spPr/>
+        <p:txBody>
+          <a:bodyPr/>
+          <a:lstStyle/>
+          <a:p>
+            <a:endParaRPr lang="ru-RU" dirty="0"/>
+          </a:p>
+        </p:txBody>
+      </p:sp>
+      <p:sp>
+        <p:nvSpPr>
+          <p:cNvPr id="4" name="Номер слайда 3"/>
+          <p:cNvSpPr>
+            <a:spLocks noGrp="1"/>
+          </p:cNvSpPr>
+          <p:nvPr>
+            <p:ph type="sldNum" sz="quarter" idx="10"/>
+          </p:nvPr>
+        </p:nvSpPr>
+        <p:spPr/>
+        <p:txBody>
+          <a:bodyPr/>
+          <a:lstStyle/>
+          <a:p>
+            <a:fld id="{B1C259BB-3010-4D83-AB37-352EA0165011}" type="slidenum">
+              <a:rPr lang="ru-RU" smtClean="0"/>
+              <a:t>14</a:t>
+            </a:fld>
+            <a:endParaRPr lang="ru-RU"/>
+          </a:p>
+        </p:txBody>
+      </p:sp>
+    </p:spTree>
+    <p:extLst>
+      <p:ext uri="{BB962C8B-B14F-4D97-AF65-F5344CB8AC3E}">
+        <p14:creationId xmlns:p14="http://schemas.microsoft.com/office/powerpoint/2010/main" val="2212763743"/>
+      </p:ext>
+    </p:extLst>
+  </p:cSld>
+  <p:clrMapOvr>
+    <a:masterClrMapping/>
+  </p:clrMapOvr>
+</p:notes>
+</file>
+
+<file path=ppt/notesSlides/notesSlide5.xml><?xml version="1.0" encoding="utf-8"?>
+<p:notes xmlns:a="http://schemas.openxmlformats.org/drawingml/2006/main" xmlns:r="http://schemas.openxmlformats.org/officeDocument/2006/relationships" xmlns:p="http://schemas.openxmlformats.org/presentationml/2006/main">
+  <p:cSld>
+    <p:spTree>
+      <p:nvGrpSpPr>
+        <p:cNvPr id="1" name=""/>
+        <p:cNvGrpSpPr/>
+        <p:nvPr/>
+      </p:nvGrpSpPr>
+      <p:grpSpPr>
+        <a:xfrm>
+          <a:off x="0" y="0"/>
+          <a:ext cx="0" cy="0"/>
+          <a:chOff x="0" y="0"/>
+          <a:chExt cx="0" cy="0"/>
+        </a:xfrm>
+      </p:grpSpPr>
+      <p:sp>
+        <p:nvSpPr>
+          <p:cNvPr id="2" name="Образ слайда 1"/>
+          <p:cNvSpPr>
+            <a:spLocks noGrp="1" noRot="1" noChangeAspect="1"/>
+          </p:cNvSpPr>
+          <p:nvPr>
+            <p:ph type="sldImg"/>
+          </p:nvPr>
+        </p:nvSpPr>
+        <p:spPr/>
+      </p:sp>
+      <p:sp>
+        <p:nvSpPr>
+          <p:cNvPr id="3" name="Заметки 2"/>
+          <p:cNvSpPr>
+            <a:spLocks noGrp="1"/>
+          </p:cNvSpPr>
+          <p:nvPr>
+            <p:ph type="body" idx="1"/>
+          </p:nvPr>
+        </p:nvSpPr>
+        <p:spPr/>
+        <p:txBody>
+          <a:bodyPr/>
+          <a:lstStyle/>
+          <a:p>
+            <a:endParaRPr lang="ru-RU" dirty="0"/>
+          </a:p>
+        </p:txBody>
+      </p:sp>
+      <p:sp>
+        <p:nvSpPr>
+          <p:cNvPr id="4" name="Номер слайда 3"/>
+          <p:cNvSpPr>
+            <a:spLocks noGrp="1"/>
+          </p:cNvSpPr>
+          <p:nvPr>
+            <p:ph type="sldNum" sz="quarter" idx="10"/>
+          </p:nvPr>
+        </p:nvSpPr>
+        <p:spPr/>
+        <p:txBody>
+          <a:bodyPr/>
+          <a:lstStyle/>
+          <a:p>
+            <a:fld id="{B1C259BB-3010-4D83-AB37-352EA0165011}" type="slidenum">
+              <a:rPr lang="ru-RU" smtClean="0"/>
+              <a:t>15</a:t>
+            </a:fld>
+            <a:endParaRPr lang="ru-RU"/>
+          </a:p>
+        </p:txBody>
+      </p:sp>
+    </p:spTree>
+    <p:extLst>
+      <p:ext uri="{BB962C8B-B14F-4D97-AF65-F5344CB8AC3E}">
+        <p14:creationId xmlns:p14="http://schemas.microsoft.com/office/powerpoint/2010/main" val="2620425185"/>
+      </p:ext>
+    </p:extLst>
+  </p:cSld>
+  <p:clrMapOvr>
+    <a:masterClrMapping/>
+  </p:clrMapOvr>
+</p:notes>
+</file>
+
 <file path=ppt/slideLayouts/slideLayout1.xml><?xml version="1.0" encoding="utf-8"?>
 <p:sldLayout xmlns:a="http://schemas.openxmlformats.org/drawingml/2006/main" xmlns:r="http://schemas.openxmlformats.org/officeDocument/2006/relationships" xmlns:p="http://schemas.openxmlformats.org/presentationml/2006/main" showMasterSp="0" type="title" preserve="1">
   <p:cSld name="Титульный слайд">
@@ -1886,7 +2148,7 @@
           <a:p>
             <a:fld id="{68F52569-A3CB-43E5-98BA-51D3DCD45EA1}" type="datetimeFigureOut">
               <a:rPr lang="ru-RU" smtClean="0"/>
-              <a:t>25.04.2018</a:t>
+              <a:t>27.04.2018</a:t>
             </a:fld>
             <a:endParaRPr lang="ru-RU"/>
           </a:p>
@@ -2322,7 +2584,7 @@
           <a:p>
             <a:fld id="{68F52569-A3CB-43E5-98BA-51D3DCD45EA1}" type="datetimeFigureOut">
               <a:rPr lang="ru-RU" smtClean="0"/>
-              <a:t>25.04.2018</a:t>
+              <a:t>27.04.2018</a:t>
             </a:fld>
             <a:endParaRPr lang="ru-RU"/>
           </a:p>
@@ -2572,7 +2834,7 @@
           <a:p>
             <a:fld id="{68F52569-A3CB-43E5-98BA-51D3DCD45EA1}" type="datetimeFigureOut">
               <a:rPr lang="ru-RU" smtClean="0"/>
-              <a:t>25.04.2018</a:t>
+              <a:t>27.04.2018</a:t>
             </a:fld>
             <a:endParaRPr lang="ru-RU"/>
           </a:p>
@@ -2880,7 +3142,7 @@
           <a:p>
             <a:fld id="{68F52569-A3CB-43E5-98BA-51D3DCD45EA1}" type="datetimeFigureOut">
               <a:rPr lang="ru-RU" smtClean="0"/>
-              <a:t>25.04.2018</a:t>
+              <a:t>27.04.2018</a:t>
             </a:fld>
             <a:endParaRPr lang="ru-RU"/>
           </a:p>
@@ -3198,7 +3460,7 @@
           <a:p>
             <a:fld id="{68F52569-A3CB-43E5-98BA-51D3DCD45EA1}" type="datetimeFigureOut">
               <a:rPr lang="ru-RU" smtClean="0"/>
-              <a:t>25.04.2018</a:t>
+              <a:t>27.04.2018</a:t>
             </a:fld>
             <a:endParaRPr lang="ru-RU"/>
           </a:p>
@@ -3500,7 +3762,7 @@
           <a:p>
             <a:fld id="{68F52569-A3CB-43E5-98BA-51D3DCD45EA1}" type="datetimeFigureOut">
               <a:rPr lang="ru-RU" smtClean="0"/>
-              <a:t>25.04.2018</a:t>
+              <a:t>27.04.2018</a:t>
             </a:fld>
             <a:endParaRPr lang="ru-RU"/>
           </a:p>
@@ -3867,7 +4129,7 @@
           <a:p>
             <a:fld id="{68F52569-A3CB-43E5-98BA-51D3DCD45EA1}" type="datetimeFigureOut">
               <a:rPr lang="ru-RU" smtClean="0"/>
-              <a:t>25.04.2018</a:t>
+              <a:t>27.04.2018</a:t>
             </a:fld>
             <a:endParaRPr lang="ru-RU"/>
           </a:p>
@@ -4041,7 +4303,7 @@
           <a:p>
             <a:fld id="{68F52569-A3CB-43E5-98BA-51D3DCD45EA1}" type="datetimeFigureOut">
               <a:rPr lang="ru-RU" smtClean="0"/>
-              <a:t>25.04.2018</a:t>
+              <a:t>27.04.2018</a:t>
             </a:fld>
             <a:endParaRPr lang="ru-RU"/>
           </a:p>
@@ -4221,7 +4483,7 @@
           <a:p>
             <a:fld id="{68F52569-A3CB-43E5-98BA-51D3DCD45EA1}" type="datetimeFigureOut">
               <a:rPr lang="ru-RU" smtClean="0"/>
-              <a:t>25.04.2018</a:t>
+              <a:t>27.04.2018</a:t>
             </a:fld>
             <a:endParaRPr lang="ru-RU"/>
           </a:p>
@@ -4391,7 +4653,7 @@
           <a:p>
             <a:fld id="{68F52569-A3CB-43E5-98BA-51D3DCD45EA1}" type="datetimeFigureOut">
               <a:rPr lang="ru-RU" smtClean="0"/>
-              <a:t>25.04.2018</a:t>
+              <a:t>27.04.2018</a:t>
             </a:fld>
             <a:endParaRPr lang="ru-RU"/>
           </a:p>
@@ -4641,7 +4903,7 @@
           <a:p>
             <a:fld id="{68F52569-A3CB-43E5-98BA-51D3DCD45EA1}" type="datetimeFigureOut">
               <a:rPr lang="ru-RU" smtClean="0"/>
-              <a:t>25.04.2018</a:t>
+              <a:t>27.04.2018</a:t>
             </a:fld>
             <a:endParaRPr lang="ru-RU"/>
           </a:p>
@@ -4877,7 +5139,7 @@
           <a:p>
             <a:fld id="{68F52569-A3CB-43E5-98BA-51D3DCD45EA1}" type="datetimeFigureOut">
               <a:rPr lang="ru-RU" smtClean="0"/>
-              <a:t>25.04.2018</a:t>
+              <a:t>27.04.2018</a:t>
             </a:fld>
             <a:endParaRPr lang="ru-RU"/>
           </a:p>
@@ -5259,7 +5521,7 @@
           <a:p>
             <a:fld id="{68F52569-A3CB-43E5-98BA-51D3DCD45EA1}" type="datetimeFigureOut">
               <a:rPr lang="ru-RU" smtClean="0"/>
-              <a:t>25.04.2018</a:t>
+              <a:t>27.04.2018</a:t>
             </a:fld>
             <a:endParaRPr lang="ru-RU"/>
           </a:p>
@@ -5377,7 +5639,7 @@
           <a:p>
             <a:fld id="{68F52569-A3CB-43E5-98BA-51D3DCD45EA1}" type="datetimeFigureOut">
               <a:rPr lang="ru-RU" smtClean="0"/>
-              <a:t>25.04.2018</a:t>
+              <a:t>27.04.2018</a:t>
             </a:fld>
             <a:endParaRPr lang="ru-RU"/>
           </a:p>
@@ -5472,7 +5734,7 @@
           <a:p>
             <a:fld id="{68F52569-A3CB-43E5-98BA-51D3DCD45EA1}" type="datetimeFigureOut">
               <a:rPr lang="ru-RU" smtClean="0"/>
-              <a:t>25.04.2018</a:t>
+              <a:t>27.04.2018</a:t>
             </a:fld>
             <a:endParaRPr lang="ru-RU"/>
           </a:p>
@@ -5727,7 +5989,7 @@
           <a:p>
             <a:fld id="{68F52569-A3CB-43E5-98BA-51D3DCD45EA1}" type="datetimeFigureOut">
               <a:rPr lang="ru-RU" smtClean="0"/>
-              <a:t>25.04.2018</a:t>
+              <a:t>27.04.2018</a:t>
             </a:fld>
             <a:endParaRPr lang="ru-RU"/>
           </a:p>
@@ -6010,7 +6272,7 @@
           <a:p>
             <a:fld id="{68F52569-A3CB-43E5-98BA-51D3DCD45EA1}" type="datetimeFigureOut">
               <a:rPr lang="ru-RU" smtClean="0"/>
-              <a:t>25.04.2018</a:t>
+              <a:t>27.04.2018</a:t>
             </a:fld>
             <a:endParaRPr lang="ru-RU"/>
           </a:p>
@@ -6416,7 +6678,7 @@
           <a:p>
             <a:fld id="{68F52569-A3CB-43E5-98BA-51D3DCD45EA1}" type="datetimeFigureOut">
               <a:rPr lang="ru-RU" smtClean="0"/>
-              <a:t>25.04.2018</a:t>
+              <a:t>27.04.2018</a:t>
             </a:fld>
             <a:endParaRPr lang="ru-RU"/>
           </a:p>
@@ -7354,6 +7616,2511 @@
         <p:cTn id="1" dur="indefinite" restart="never" nodeType="tmRoot"/>
       </p:par>
     </p:tnLst>
+  </p:timing>
+</p:sld>
+</file>
+
+<file path=ppt/slides/slide11.xml><?xml version="1.0" encoding="utf-8"?>
+<p:sld xmlns:a="http://schemas.openxmlformats.org/drawingml/2006/main" xmlns:r="http://schemas.openxmlformats.org/officeDocument/2006/relationships" xmlns:p="http://schemas.openxmlformats.org/presentationml/2006/main">
+  <p:cSld>
+    <p:spTree>
+      <p:nvGrpSpPr>
+        <p:cNvPr id="1" name=""/>
+        <p:cNvGrpSpPr/>
+        <p:nvPr/>
+      </p:nvGrpSpPr>
+      <p:grpSpPr>
+        <a:xfrm>
+          <a:off x="0" y="0"/>
+          <a:ext cx="0" cy="0"/>
+          <a:chOff x="0" y="0"/>
+          <a:chExt cx="0" cy="0"/>
+        </a:xfrm>
+      </p:grpSpPr>
+      <p:sp>
+        <p:nvSpPr>
+          <p:cNvPr id="2" name="Заголовок 1"/>
+          <p:cNvSpPr>
+            <a:spLocks noGrp="1"/>
+          </p:cNvSpPr>
+          <p:nvPr>
+            <p:ph type="title"/>
+          </p:nvPr>
+        </p:nvSpPr>
+        <p:spPr>
+          <a:xfrm>
+            <a:off x="684212" y="493302"/>
+            <a:ext cx="8534400" cy="1507067"/>
+          </a:xfrm>
+        </p:spPr>
+        <p:txBody>
+          <a:bodyPr/>
+          <a:lstStyle/>
+          <a:p>
+            <a:r>
+              <a:rPr lang="en-US" dirty="0" smtClean="0"/>
+              <a:t>.NET</a:t>
+            </a:r>
+            <a:r>
+              <a:rPr lang="ru-RU" dirty="0" smtClean="0"/>
+              <a:t> </a:t>
+            </a:r>
+            <a:r>
+              <a:rPr lang="en-US" dirty="0" smtClean="0"/>
+              <a:t>Framework </a:t>
+            </a:r>
+            <a:r>
+              <a:rPr lang="en-US" dirty="0" smtClean="0"/>
+              <a:t>4.0</a:t>
+            </a:r>
+            <a:endParaRPr lang="ru-RU" dirty="0"/>
+          </a:p>
+        </p:txBody>
+      </p:sp>
+      <p:sp>
+        <p:nvSpPr>
+          <p:cNvPr id="3" name="Объект 2"/>
+          <p:cNvSpPr>
+            <a:spLocks noGrp="1"/>
+          </p:cNvSpPr>
+          <p:nvPr>
+            <p:ph idx="1"/>
+          </p:nvPr>
+        </p:nvSpPr>
+        <p:spPr>
+          <a:xfrm>
+            <a:off x="684212" y="2000369"/>
+            <a:ext cx="8534400" cy="1191405"/>
+          </a:xfrm>
+        </p:spPr>
+        <p:txBody>
+          <a:bodyPr/>
+          <a:lstStyle/>
+          <a:p>
+            <a:r>
+              <a:rPr lang="en-US" dirty="0" smtClean="0"/>
+              <a:t>Microsoft </a:t>
+            </a:r>
+            <a:r>
+              <a:rPr lang="ru-RU" dirty="0" smtClean="0"/>
+              <a:t>представила </a:t>
+            </a:r>
+            <a:r>
+              <a:rPr lang="en-US" dirty="0" smtClean="0"/>
+              <a:t>TPL </a:t>
+            </a:r>
+            <a:r>
+              <a:rPr lang="ru-RU" dirty="0" smtClean="0"/>
+              <a:t>и выделила новый концепт – Задачи (</a:t>
+            </a:r>
+            <a:r>
+              <a:rPr lang="en-US" dirty="0" smtClean="0"/>
+              <a:t>Tasks</a:t>
+            </a:r>
+            <a:r>
+              <a:rPr lang="ru-RU" dirty="0" smtClean="0"/>
+              <a:t>)</a:t>
+            </a:r>
+            <a:endParaRPr lang="ru-RU" dirty="0"/>
+          </a:p>
+        </p:txBody>
+      </p:sp>
+      <p:pic>
+        <p:nvPicPr>
+          <p:cNvPr id="1026" name="Picture 2" descr="ÐÐ°ÑÑÐ¸Ð½ÐºÐ¸ Ð¿Ð¾ Ð·Ð°Ð¿ÑÐ¾ÑÑ Ð³Ð¾Ð¼ÐµÑ woohoo"/>
+          <p:cNvPicPr>
+            <a:picLocks noChangeAspect="1" noChangeArrowheads="1"/>
+          </p:cNvPicPr>
+          <p:nvPr/>
+        </p:nvPicPr>
+        <p:blipFill>
+          <a:blip r:embed="rId3" cstate="print">
+            <a:extLst>
+              <a:ext uri="{28A0092B-C50C-407E-A947-70E740481C1C}">
+                <a14:useLocalDpi xmlns:a14="http://schemas.microsoft.com/office/drawing/2010/main" val="0"/>
+              </a:ext>
+            </a:extLst>
+          </a:blip>
+          <a:stretch>
+            <a:fillRect/>
+          </a:stretch>
+        </p:blipFill>
+        <p:spPr bwMode="auto">
+          <a:xfrm>
+            <a:off x="1842860" y="3191774"/>
+            <a:ext cx="5994853" cy="3372312"/>
+          </a:xfrm>
+          <a:prstGeom prst="rect">
+            <a:avLst/>
+          </a:prstGeom>
+          <a:noFill/>
+          <a:extLst>
+            <a:ext uri="{909E8E84-426E-40DD-AFC4-6F175D3DCCD1}">
+              <a14:hiddenFill xmlns:a14="http://schemas.microsoft.com/office/drawing/2010/main">
+                <a:solidFill>
+                  <a:srgbClr val="FFFFFF"/>
+                </a:solidFill>
+              </a14:hiddenFill>
+            </a:ext>
+          </a:extLst>
+        </p:spPr>
+      </p:pic>
+    </p:spTree>
+    <p:extLst>
+      <p:ext uri="{BB962C8B-B14F-4D97-AF65-F5344CB8AC3E}">
+        <p14:creationId xmlns:p14="http://schemas.microsoft.com/office/powerpoint/2010/main" val="2197513362"/>
+      </p:ext>
+    </p:extLst>
+  </p:cSld>
+  <p:clrMapOvr>
+    <a:masterClrMapping/>
+  </p:clrMapOvr>
+  <p:timing>
+    <p:tnLst>
+      <p:par>
+        <p:cTn id="1" dur="indefinite" restart="never" nodeType="tmRoot">
+          <p:childTnLst>
+            <p:seq concurrent="1" nextAc="seek">
+              <p:cTn id="2" dur="indefinite" nodeType="mainSeq">
+                <p:childTnLst>
+                  <p:par>
+                    <p:cTn id="3" fill="hold">
+                      <p:stCondLst>
+                        <p:cond delay="indefinite"/>
+                      </p:stCondLst>
+                      <p:childTnLst>
+                        <p:par>
+                          <p:cTn id="4" fill="hold">
+                            <p:stCondLst>
+                              <p:cond delay="0"/>
+                            </p:stCondLst>
+                            <p:childTnLst>
+                              <p:par>
+                                <p:cTn id="5" presetID="42" presetClass="entr" presetSubtype="0" fill="hold" grpId="0" nodeType="clickEffect">
+                                  <p:stCondLst>
+                                    <p:cond delay="0"/>
+                                  </p:stCondLst>
+                                  <p:childTnLst>
+                                    <p:set>
+                                      <p:cBhvr>
+                                        <p:cTn id="6" dur="1" fill="hold">
+                                          <p:stCondLst>
+                                            <p:cond delay="0"/>
+                                          </p:stCondLst>
+                                        </p:cTn>
+                                        <p:tgtEl>
+                                          <p:spTgt spid="3">
+                                            <p:txEl>
+                                              <p:pRg st="0" end="0"/>
+                                            </p:txEl>
+                                          </p:spTgt>
+                                        </p:tgtEl>
+                                        <p:attrNameLst>
+                                          <p:attrName>style.visibility</p:attrName>
+                                        </p:attrNameLst>
+                                      </p:cBhvr>
+                                      <p:to>
+                                        <p:strVal val="visible"/>
+                                      </p:to>
+                                    </p:set>
+                                    <p:animEffect transition="in" filter="fade">
+                                      <p:cBhvr>
+                                        <p:cTn id="7" dur="1000"/>
+                                        <p:tgtEl>
+                                          <p:spTgt spid="3">
+                                            <p:txEl>
+                                              <p:pRg st="0" end="0"/>
+                                            </p:txEl>
+                                          </p:spTgt>
+                                        </p:tgtEl>
+                                      </p:cBhvr>
+                                    </p:animEffect>
+                                    <p:anim calcmode="lin" valueType="num">
+                                      <p:cBhvr>
+                                        <p:cTn id="8" dur="1000" fill="hold"/>
+                                        <p:tgtEl>
+                                          <p:spTgt spid="3">
+                                            <p:txEl>
+                                              <p:pRg st="0" end="0"/>
+                                            </p:txEl>
+                                          </p:spTgt>
+                                        </p:tgtEl>
+                                        <p:attrNameLst>
+                                          <p:attrName>ppt_x</p:attrName>
+                                        </p:attrNameLst>
+                                      </p:cBhvr>
+                                      <p:tavLst>
+                                        <p:tav tm="0">
+                                          <p:val>
+                                            <p:strVal val="#ppt_x"/>
+                                          </p:val>
+                                        </p:tav>
+                                        <p:tav tm="100000">
+                                          <p:val>
+                                            <p:strVal val="#ppt_x"/>
+                                          </p:val>
+                                        </p:tav>
+                                      </p:tavLst>
+                                    </p:anim>
+                                    <p:anim calcmode="lin" valueType="num">
+                                      <p:cBhvr>
+                                        <p:cTn id="9" dur="1000" fill="hold"/>
+                                        <p:tgtEl>
+                                          <p:spTgt spid="3">
+                                            <p:txEl>
+                                              <p:pRg st="0" end="0"/>
+                                            </p:txEl>
+                                          </p:spTgt>
+                                        </p:tgtEl>
+                                        <p:attrNameLst>
+                                          <p:attrName>ppt_y</p:attrName>
+                                        </p:attrNameLst>
+                                      </p:cBhvr>
+                                      <p:tavLst>
+                                        <p:tav tm="0">
+                                          <p:val>
+                                            <p:strVal val="#ppt_y+.1"/>
+                                          </p:val>
+                                        </p:tav>
+                                        <p:tav tm="100000">
+                                          <p:val>
+                                            <p:strVal val="#ppt_y"/>
+                                          </p:val>
+                                        </p:tav>
+                                      </p:tavLst>
+                                    </p:anim>
+                                  </p:childTnLst>
+                                </p:cTn>
+                              </p:par>
+                            </p:childTnLst>
+                          </p:cTn>
+                        </p:par>
+                      </p:childTnLst>
+                    </p:cTn>
+                  </p:par>
+                  <p:par>
+                    <p:cTn id="10" fill="hold">
+                      <p:stCondLst>
+                        <p:cond delay="indefinite"/>
+                      </p:stCondLst>
+                      <p:childTnLst>
+                        <p:par>
+                          <p:cTn id="11" fill="hold">
+                            <p:stCondLst>
+                              <p:cond delay="0"/>
+                            </p:stCondLst>
+                            <p:childTnLst>
+                              <p:par>
+                                <p:cTn id="12" presetID="42" presetClass="entr" presetSubtype="0" fill="hold" nodeType="clickEffect">
+                                  <p:stCondLst>
+                                    <p:cond delay="0"/>
+                                  </p:stCondLst>
+                                  <p:childTnLst>
+                                    <p:set>
+                                      <p:cBhvr>
+                                        <p:cTn id="13" dur="1" fill="hold">
+                                          <p:stCondLst>
+                                            <p:cond delay="0"/>
+                                          </p:stCondLst>
+                                        </p:cTn>
+                                        <p:tgtEl>
+                                          <p:spTgt spid="1026"/>
+                                        </p:tgtEl>
+                                        <p:attrNameLst>
+                                          <p:attrName>style.visibility</p:attrName>
+                                        </p:attrNameLst>
+                                      </p:cBhvr>
+                                      <p:to>
+                                        <p:strVal val="visible"/>
+                                      </p:to>
+                                    </p:set>
+                                    <p:animEffect transition="in" filter="fade">
+                                      <p:cBhvr>
+                                        <p:cTn id="14" dur="1000"/>
+                                        <p:tgtEl>
+                                          <p:spTgt spid="1026"/>
+                                        </p:tgtEl>
+                                      </p:cBhvr>
+                                    </p:animEffect>
+                                    <p:anim calcmode="lin" valueType="num">
+                                      <p:cBhvr>
+                                        <p:cTn id="15" dur="1000" fill="hold"/>
+                                        <p:tgtEl>
+                                          <p:spTgt spid="1026"/>
+                                        </p:tgtEl>
+                                        <p:attrNameLst>
+                                          <p:attrName>ppt_x</p:attrName>
+                                        </p:attrNameLst>
+                                      </p:cBhvr>
+                                      <p:tavLst>
+                                        <p:tav tm="0">
+                                          <p:val>
+                                            <p:strVal val="#ppt_x"/>
+                                          </p:val>
+                                        </p:tav>
+                                        <p:tav tm="100000">
+                                          <p:val>
+                                            <p:strVal val="#ppt_x"/>
+                                          </p:val>
+                                        </p:tav>
+                                      </p:tavLst>
+                                    </p:anim>
+                                    <p:anim calcmode="lin" valueType="num">
+                                      <p:cBhvr>
+                                        <p:cTn id="16" dur="1000" fill="hold"/>
+                                        <p:tgtEl>
+                                          <p:spTgt spid="1026"/>
+                                        </p:tgtEl>
+                                        <p:attrNameLst>
+                                          <p:attrName>ppt_y</p:attrName>
+                                        </p:attrNameLst>
+                                      </p:cBhvr>
+                                      <p:tavLst>
+                                        <p:tav tm="0">
+                                          <p:val>
+                                            <p:strVal val="#ppt_y+.1"/>
+                                          </p:val>
+                                        </p:tav>
+                                        <p:tav tm="100000">
+                                          <p:val>
+                                            <p:strVal val="#ppt_y"/>
+                                          </p:val>
+                                        </p:tav>
+                                      </p:tavLst>
+                                    </p:anim>
+                                  </p:childTnLst>
+                                </p:cTn>
+                              </p:par>
+                            </p:childTnLst>
+                          </p:cTn>
+                        </p:par>
+                      </p:childTnLst>
+                    </p:cTn>
+                  </p:par>
+                </p:childTnLst>
+              </p:cTn>
+              <p:prevCondLst>
+                <p:cond evt="onPrev" delay="0">
+                  <p:tgtEl>
+                    <p:sldTgt/>
+                  </p:tgtEl>
+                </p:cond>
+              </p:prevCondLst>
+              <p:nextCondLst>
+                <p:cond evt="onNext" delay="0">
+                  <p:tgtEl>
+                    <p:sldTgt/>
+                  </p:tgtEl>
+                </p:cond>
+              </p:nextCondLst>
+            </p:seq>
+          </p:childTnLst>
+        </p:cTn>
+      </p:par>
+    </p:tnLst>
+    <p:bldLst>
+      <p:bldP spid="3" grpId="0" build="p"/>
+    </p:bldLst>
+  </p:timing>
+</p:sld>
+</file>
+
+<file path=ppt/slides/slide12.xml><?xml version="1.0" encoding="utf-8"?>
+<p:sld xmlns:a="http://schemas.openxmlformats.org/drawingml/2006/main" xmlns:r="http://schemas.openxmlformats.org/officeDocument/2006/relationships" xmlns:p="http://schemas.openxmlformats.org/presentationml/2006/main">
+  <p:cSld>
+    <p:bg>
+      <p:bgPr>
+        <a:gradFill rotWithShape="1">
+          <a:gsLst>
+            <a:gs pos="5000">
+              <a:schemeClr val="bg2">
+                <a:tint val="97000"/>
+                <a:hueMod val="92000"/>
+                <a:satMod val="169000"/>
+                <a:lumMod val="164000"/>
+              </a:schemeClr>
+            </a:gs>
+            <a:gs pos="100000">
+              <a:schemeClr val="bg2">
+                <a:shade val="96000"/>
+                <a:satMod val="120000"/>
+                <a:lumMod val="90000"/>
+              </a:schemeClr>
+            </a:gs>
+          </a:gsLst>
+          <a:lin ang="6120000" scaled="1"/>
+        </a:gradFill>
+        <a:effectLst/>
+      </p:bgPr>
+    </p:bg>
+    <p:spTree>
+      <p:nvGrpSpPr>
+        <p:cNvPr id="1" name=""/>
+        <p:cNvGrpSpPr/>
+        <p:nvPr/>
+      </p:nvGrpSpPr>
+      <p:grpSpPr>
+        <a:xfrm>
+          <a:off x="0" y="0"/>
+          <a:ext cx="0" cy="0"/>
+          <a:chOff x="0" y="0"/>
+          <a:chExt cx="0" cy="0"/>
+        </a:xfrm>
+      </p:grpSpPr>
+      <p:sp>
+        <p:nvSpPr>
+          <p:cNvPr id="2" name="Заголовок 1"/>
+          <p:cNvSpPr>
+            <a:spLocks noGrp="1"/>
+          </p:cNvSpPr>
+          <p:nvPr>
+            <p:ph type="title"/>
+          </p:nvPr>
+        </p:nvSpPr>
+        <p:spPr>
+          <a:xfrm>
+            <a:off x="4997418" y="2503256"/>
+            <a:ext cx="1981351" cy="1507067"/>
+          </a:xfrm>
+        </p:spPr>
+        <p:txBody>
+          <a:bodyPr>
+            <a:normAutofit fontScale="90000"/>
+          </a:bodyPr>
+          <a:lstStyle/>
+          <a:p>
+            <a:r>
+              <a:rPr lang="en-US" sz="4800" dirty="0" smtClean="0"/>
+              <a:t>DEMO</a:t>
+            </a:r>
+            <a:endParaRPr lang="ru-RU" dirty="0"/>
+          </a:p>
+        </p:txBody>
+      </p:sp>
+    </p:spTree>
+    <p:extLst>
+      <p:ext uri="{BB962C8B-B14F-4D97-AF65-F5344CB8AC3E}">
+        <p14:creationId xmlns:p14="http://schemas.microsoft.com/office/powerpoint/2010/main" val="3441115897"/>
+      </p:ext>
+    </p:extLst>
+  </p:cSld>
+  <p:clrMapOvr>
+    <a:masterClrMapping/>
+  </p:clrMapOvr>
+  <p:timing>
+    <p:tnLst>
+      <p:par>
+        <p:cTn id="1" dur="indefinite" restart="never" nodeType="tmRoot"/>
+      </p:par>
+    </p:tnLst>
+  </p:timing>
+</p:sld>
+</file>
+
+<file path=ppt/slides/slide13.xml><?xml version="1.0" encoding="utf-8"?>
+<p:sld xmlns:a="http://schemas.openxmlformats.org/drawingml/2006/main" xmlns:r="http://schemas.openxmlformats.org/officeDocument/2006/relationships" xmlns:p="http://schemas.openxmlformats.org/presentationml/2006/main">
+  <p:cSld>
+    <p:spTree>
+      <p:nvGrpSpPr>
+        <p:cNvPr id="1" name=""/>
+        <p:cNvGrpSpPr/>
+        <p:nvPr/>
+      </p:nvGrpSpPr>
+      <p:grpSpPr>
+        <a:xfrm>
+          <a:off x="0" y="0"/>
+          <a:ext cx="0" cy="0"/>
+          <a:chOff x="0" y="0"/>
+          <a:chExt cx="0" cy="0"/>
+        </a:xfrm>
+      </p:grpSpPr>
+      <p:sp>
+        <p:nvSpPr>
+          <p:cNvPr id="2" name="Заголовок 1"/>
+          <p:cNvSpPr>
+            <a:spLocks noGrp="1"/>
+          </p:cNvSpPr>
+          <p:nvPr>
+            <p:ph type="title"/>
+          </p:nvPr>
+        </p:nvSpPr>
+        <p:spPr>
+          <a:xfrm>
+            <a:off x="684212" y="493302"/>
+            <a:ext cx="8534400" cy="1507067"/>
+          </a:xfrm>
+        </p:spPr>
+        <p:txBody>
+          <a:bodyPr/>
+          <a:lstStyle/>
+          <a:p>
+            <a:r>
+              <a:rPr lang="en-US" dirty="0" smtClean="0"/>
+              <a:t>.NET</a:t>
+            </a:r>
+            <a:r>
+              <a:rPr lang="ru-RU" dirty="0" smtClean="0"/>
+              <a:t> </a:t>
+            </a:r>
+            <a:r>
+              <a:rPr lang="en-US" dirty="0" smtClean="0"/>
+              <a:t>Framework </a:t>
+            </a:r>
+            <a:r>
+              <a:rPr lang="ru-RU" dirty="0" smtClean="0"/>
+              <a:t>4</a:t>
+            </a:r>
+            <a:r>
+              <a:rPr lang="en-US" dirty="0" smtClean="0"/>
+              <a:t>.</a:t>
+            </a:r>
+            <a:r>
+              <a:rPr lang="ru-RU" dirty="0" smtClean="0"/>
+              <a:t>5</a:t>
+            </a:r>
+            <a:endParaRPr lang="ru-RU" dirty="0"/>
+          </a:p>
+        </p:txBody>
+      </p:sp>
+      <p:sp>
+        <p:nvSpPr>
+          <p:cNvPr id="3" name="Объект 2"/>
+          <p:cNvSpPr>
+            <a:spLocks noGrp="1"/>
+          </p:cNvSpPr>
+          <p:nvPr>
+            <p:ph idx="1"/>
+          </p:nvPr>
+        </p:nvSpPr>
+        <p:spPr>
+          <a:xfrm>
+            <a:off x="684212" y="2000369"/>
+            <a:ext cx="8534400" cy="2127131"/>
+          </a:xfrm>
+        </p:spPr>
+        <p:txBody>
+          <a:bodyPr>
+            <a:normAutofit/>
+          </a:bodyPr>
+          <a:lstStyle/>
+          <a:p>
+            <a:r>
+              <a:rPr lang="ru-RU" dirty="0" smtClean="0"/>
+              <a:t>Появляются ключевые слова </a:t>
+            </a:r>
+            <a:r>
+              <a:rPr lang="en-US" dirty="0" smtClean="0"/>
+              <a:t>async</a:t>
+            </a:r>
+            <a:r>
+              <a:rPr lang="en-US" dirty="0"/>
+              <a:t> </a:t>
+            </a:r>
+            <a:r>
+              <a:rPr lang="ru-RU" dirty="0" smtClean="0"/>
+              <a:t>и </a:t>
+            </a:r>
+            <a:r>
+              <a:rPr lang="en-US" dirty="0" smtClean="0"/>
+              <a:t>await</a:t>
+            </a:r>
+          </a:p>
+          <a:p>
+            <a:r>
+              <a:rPr lang="en-US" dirty="0" smtClean="0"/>
+              <a:t>Microsoft </a:t>
+            </a:r>
+            <a:r>
+              <a:rPr lang="ru-RU" dirty="0" smtClean="0"/>
+              <a:t>формулирует новый подход к асинхронному программированию – </a:t>
+            </a:r>
+            <a:r>
+              <a:rPr lang="en-US" dirty="0" smtClean="0"/>
+              <a:t>TAP (Task-based Asynchronous Programming)</a:t>
+            </a:r>
+            <a:endParaRPr lang="ru-RU" dirty="0"/>
+          </a:p>
+        </p:txBody>
+      </p:sp>
+    </p:spTree>
+    <p:extLst>
+      <p:ext uri="{BB962C8B-B14F-4D97-AF65-F5344CB8AC3E}">
+        <p14:creationId xmlns:p14="http://schemas.microsoft.com/office/powerpoint/2010/main" val="3559773472"/>
+      </p:ext>
+    </p:extLst>
+  </p:cSld>
+  <p:clrMapOvr>
+    <a:masterClrMapping/>
+  </p:clrMapOvr>
+  <p:timing>
+    <p:tnLst>
+      <p:par>
+        <p:cTn id="1" dur="indefinite" restart="never" nodeType="tmRoot">
+          <p:childTnLst>
+            <p:seq concurrent="1" nextAc="seek">
+              <p:cTn id="2" dur="indefinite" nodeType="mainSeq">
+                <p:childTnLst>
+                  <p:par>
+                    <p:cTn id="3" fill="hold">
+                      <p:stCondLst>
+                        <p:cond delay="indefinite"/>
+                      </p:stCondLst>
+                      <p:childTnLst>
+                        <p:par>
+                          <p:cTn id="4" fill="hold">
+                            <p:stCondLst>
+                              <p:cond delay="0"/>
+                            </p:stCondLst>
+                            <p:childTnLst>
+                              <p:par>
+                                <p:cTn id="5" presetID="42" presetClass="entr" presetSubtype="0" fill="hold" grpId="0" nodeType="clickEffect">
+                                  <p:stCondLst>
+                                    <p:cond delay="0"/>
+                                  </p:stCondLst>
+                                  <p:childTnLst>
+                                    <p:set>
+                                      <p:cBhvr>
+                                        <p:cTn id="6" dur="1" fill="hold">
+                                          <p:stCondLst>
+                                            <p:cond delay="0"/>
+                                          </p:stCondLst>
+                                        </p:cTn>
+                                        <p:tgtEl>
+                                          <p:spTgt spid="3">
+                                            <p:txEl>
+                                              <p:pRg st="0" end="0"/>
+                                            </p:txEl>
+                                          </p:spTgt>
+                                        </p:tgtEl>
+                                        <p:attrNameLst>
+                                          <p:attrName>style.visibility</p:attrName>
+                                        </p:attrNameLst>
+                                      </p:cBhvr>
+                                      <p:to>
+                                        <p:strVal val="visible"/>
+                                      </p:to>
+                                    </p:set>
+                                    <p:animEffect transition="in" filter="fade">
+                                      <p:cBhvr>
+                                        <p:cTn id="7" dur="1000"/>
+                                        <p:tgtEl>
+                                          <p:spTgt spid="3">
+                                            <p:txEl>
+                                              <p:pRg st="0" end="0"/>
+                                            </p:txEl>
+                                          </p:spTgt>
+                                        </p:tgtEl>
+                                      </p:cBhvr>
+                                    </p:animEffect>
+                                    <p:anim calcmode="lin" valueType="num">
+                                      <p:cBhvr>
+                                        <p:cTn id="8" dur="1000" fill="hold"/>
+                                        <p:tgtEl>
+                                          <p:spTgt spid="3">
+                                            <p:txEl>
+                                              <p:pRg st="0" end="0"/>
+                                            </p:txEl>
+                                          </p:spTgt>
+                                        </p:tgtEl>
+                                        <p:attrNameLst>
+                                          <p:attrName>ppt_x</p:attrName>
+                                        </p:attrNameLst>
+                                      </p:cBhvr>
+                                      <p:tavLst>
+                                        <p:tav tm="0">
+                                          <p:val>
+                                            <p:strVal val="#ppt_x"/>
+                                          </p:val>
+                                        </p:tav>
+                                        <p:tav tm="100000">
+                                          <p:val>
+                                            <p:strVal val="#ppt_x"/>
+                                          </p:val>
+                                        </p:tav>
+                                      </p:tavLst>
+                                    </p:anim>
+                                    <p:anim calcmode="lin" valueType="num">
+                                      <p:cBhvr>
+                                        <p:cTn id="9" dur="1000" fill="hold"/>
+                                        <p:tgtEl>
+                                          <p:spTgt spid="3">
+                                            <p:txEl>
+                                              <p:pRg st="0" end="0"/>
+                                            </p:txEl>
+                                          </p:spTgt>
+                                        </p:tgtEl>
+                                        <p:attrNameLst>
+                                          <p:attrName>ppt_y</p:attrName>
+                                        </p:attrNameLst>
+                                      </p:cBhvr>
+                                      <p:tavLst>
+                                        <p:tav tm="0">
+                                          <p:val>
+                                            <p:strVal val="#ppt_y+.1"/>
+                                          </p:val>
+                                        </p:tav>
+                                        <p:tav tm="100000">
+                                          <p:val>
+                                            <p:strVal val="#ppt_y"/>
+                                          </p:val>
+                                        </p:tav>
+                                      </p:tavLst>
+                                    </p:anim>
+                                  </p:childTnLst>
+                                </p:cTn>
+                              </p:par>
+                            </p:childTnLst>
+                          </p:cTn>
+                        </p:par>
+                      </p:childTnLst>
+                    </p:cTn>
+                  </p:par>
+                  <p:par>
+                    <p:cTn id="10" fill="hold">
+                      <p:stCondLst>
+                        <p:cond delay="indefinite"/>
+                      </p:stCondLst>
+                      <p:childTnLst>
+                        <p:par>
+                          <p:cTn id="11" fill="hold">
+                            <p:stCondLst>
+                              <p:cond delay="0"/>
+                            </p:stCondLst>
+                            <p:childTnLst>
+                              <p:par>
+                                <p:cTn id="12" presetID="42" presetClass="entr" presetSubtype="0" fill="hold" grpId="0" nodeType="clickEffect">
+                                  <p:stCondLst>
+                                    <p:cond delay="0"/>
+                                  </p:stCondLst>
+                                  <p:childTnLst>
+                                    <p:set>
+                                      <p:cBhvr>
+                                        <p:cTn id="13" dur="1" fill="hold">
+                                          <p:stCondLst>
+                                            <p:cond delay="0"/>
+                                          </p:stCondLst>
+                                        </p:cTn>
+                                        <p:tgtEl>
+                                          <p:spTgt spid="3">
+                                            <p:txEl>
+                                              <p:pRg st="1" end="1"/>
+                                            </p:txEl>
+                                          </p:spTgt>
+                                        </p:tgtEl>
+                                        <p:attrNameLst>
+                                          <p:attrName>style.visibility</p:attrName>
+                                        </p:attrNameLst>
+                                      </p:cBhvr>
+                                      <p:to>
+                                        <p:strVal val="visible"/>
+                                      </p:to>
+                                    </p:set>
+                                    <p:animEffect transition="in" filter="fade">
+                                      <p:cBhvr>
+                                        <p:cTn id="14" dur="1000"/>
+                                        <p:tgtEl>
+                                          <p:spTgt spid="3">
+                                            <p:txEl>
+                                              <p:pRg st="1" end="1"/>
+                                            </p:txEl>
+                                          </p:spTgt>
+                                        </p:tgtEl>
+                                      </p:cBhvr>
+                                    </p:animEffect>
+                                    <p:anim calcmode="lin" valueType="num">
+                                      <p:cBhvr>
+                                        <p:cTn id="15" dur="1000" fill="hold"/>
+                                        <p:tgtEl>
+                                          <p:spTgt spid="3">
+                                            <p:txEl>
+                                              <p:pRg st="1" end="1"/>
+                                            </p:txEl>
+                                          </p:spTgt>
+                                        </p:tgtEl>
+                                        <p:attrNameLst>
+                                          <p:attrName>ppt_x</p:attrName>
+                                        </p:attrNameLst>
+                                      </p:cBhvr>
+                                      <p:tavLst>
+                                        <p:tav tm="0">
+                                          <p:val>
+                                            <p:strVal val="#ppt_x"/>
+                                          </p:val>
+                                        </p:tav>
+                                        <p:tav tm="100000">
+                                          <p:val>
+                                            <p:strVal val="#ppt_x"/>
+                                          </p:val>
+                                        </p:tav>
+                                      </p:tavLst>
+                                    </p:anim>
+                                    <p:anim calcmode="lin" valueType="num">
+                                      <p:cBhvr>
+                                        <p:cTn id="16" dur="1000" fill="hold"/>
+                                        <p:tgtEl>
+                                          <p:spTgt spid="3">
+                                            <p:txEl>
+                                              <p:pRg st="1" end="1"/>
+                                            </p:txEl>
+                                          </p:spTgt>
+                                        </p:tgtEl>
+                                        <p:attrNameLst>
+                                          <p:attrName>ppt_y</p:attrName>
+                                        </p:attrNameLst>
+                                      </p:cBhvr>
+                                      <p:tavLst>
+                                        <p:tav tm="0">
+                                          <p:val>
+                                            <p:strVal val="#ppt_y+.1"/>
+                                          </p:val>
+                                        </p:tav>
+                                        <p:tav tm="100000">
+                                          <p:val>
+                                            <p:strVal val="#ppt_y"/>
+                                          </p:val>
+                                        </p:tav>
+                                      </p:tavLst>
+                                    </p:anim>
+                                  </p:childTnLst>
+                                </p:cTn>
+                              </p:par>
+                            </p:childTnLst>
+                          </p:cTn>
+                        </p:par>
+                      </p:childTnLst>
+                    </p:cTn>
+                  </p:par>
+                </p:childTnLst>
+              </p:cTn>
+              <p:prevCondLst>
+                <p:cond evt="onPrev" delay="0">
+                  <p:tgtEl>
+                    <p:sldTgt/>
+                  </p:tgtEl>
+                </p:cond>
+              </p:prevCondLst>
+              <p:nextCondLst>
+                <p:cond evt="onNext" delay="0">
+                  <p:tgtEl>
+                    <p:sldTgt/>
+                  </p:tgtEl>
+                </p:cond>
+              </p:nextCondLst>
+            </p:seq>
+          </p:childTnLst>
+        </p:cTn>
+      </p:par>
+    </p:tnLst>
+    <p:bldLst>
+      <p:bldP spid="3" grpId="0" build="p"/>
+    </p:bldLst>
+  </p:timing>
+</p:sld>
+</file>
+
+<file path=ppt/slides/slide14.xml><?xml version="1.0" encoding="utf-8"?>
+<p:sld xmlns:a="http://schemas.openxmlformats.org/drawingml/2006/main" xmlns:r="http://schemas.openxmlformats.org/officeDocument/2006/relationships" xmlns:p="http://schemas.openxmlformats.org/presentationml/2006/main">
+  <p:cSld>
+    <p:spTree>
+      <p:nvGrpSpPr>
+        <p:cNvPr id="1" name=""/>
+        <p:cNvGrpSpPr/>
+        <p:nvPr/>
+      </p:nvGrpSpPr>
+      <p:grpSpPr>
+        <a:xfrm>
+          <a:off x="0" y="0"/>
+          <a:ext cx="0" cy="0"/>
+          <a:chOff x="0" y="0"/>
+          <a:chExt cx="0" cy="0"/>
+        </a:xfrm>
+      </p:grpSpPr>
+      <p:pic>
+        <p:nvPicPr>
+          <p:cNvPr id="4" name="Рисунок 3"/>
+          <p:cNvPicPr>
+            <a:picLocks noChangeAspect="1"/>
+          </p:cNvPicPr>
+          <p:nvPr/>
+        </p:nvPicPr>
+        <p:blipFill>
+          <a:blip r:embed="rId3"/>
+          <a:stretch>
+            <a:fillRect/>
+          </a:stretch>
+        </p:blipFill>
+        <p:spPr>
+          <a:xfrm>
+            <a:off x="839561" y="139700"/>
+            <a:ext cx="6112237" cy="6527800"/>
+          </a:xfrm>
+          <a:prstGeom prst="rect">
+            <a:avLst/>
+          </a:prstGeom>
+        </p:spPr>
+      </p:pic>
+      <p:cxnSp>
+        <p:nvCxnSpPr>
+          <p:cNvPr id="10" name="Прямая со стрелкой 9"/>
+          <p:cNvCxnSpPr/>
+          <p:nvPr/>
+        </p:nvCxnSpPr>
+        <p:spPr>
+          <a:xfrm>
+            <a:off x="1181100" y="533400"/>
+            <a:ext cx="0" cy="571500"/>
+          </a:xfrm>
+          <a:prstGeom prst="straightConnector1">
+            <a:avLst/>
+          </a:prstGeom>
+          <a:ln>
+            <a:tailEnd type="triangle"/>
+          </a:ln>
+        </p:spPr>
+        <p:style>
+          <a:lnRef idx="3">
+            <a:schemeClr val="accent6"/>
+          </a:lnRef>
+          <a:fillRef idx="0">
+            <a:schemeClr val="accent6"/>
+          </a:fillRef>
+          <a:effectRef idx="2">
+            <a:schemeClr val="accent6"/>
+          </a:effectRef>
+          <a:fontRef idx="minor">
+            <a:schemeClr val="tx1"/>
+          </a:fontRef>
+        </p:style>
+      </p:cxnSp>
+      <p:cxnSp>
+        <p:nvCxnSpPr>
+          <p:cNvPr id="11" name="Прямая со стрелкой 10"/>
+          <p:cNvCxnSpPr/>
+          <p:nvPr/>
+        </p:nvCxnSpPr>
+        <p:spPr>
+          <a:xfrm>
+            <a:off x="1181100" y="1244600"/>
+            <a:ext cx="0" cy="936000"/>
+          </a:xfrm>
+          <a:prstGeom prst="straightConnector1">
+            <a:avLst/>
+          </a:prstGeom>
+          <a:ln>
+            <a:tailEnd type="triangle"/>
+          </a:ln>
+        </p:spPr>
+        <p:style>
+          <a:lnRef idx="3">
+            <a:schemeClr val="accent6"/>
+          </a:lnRef>
+          <a:fillRef idx="0">
+            <a:schemeClr val="accent6"/>
+          </a:fillRef>
+          <a:effectRef idx="2">
+            <a:schemeClr val="accent6"/>
+          </a:effectRef>
+          <a:fontRef idx="minor">
+            <a:schemeClr val="tx1"/>
+          </a:fontRef>
+        </p:style>
+      </p:cxnSp>
+      <p:cxnSp>
+        <p:nvCxnSpPr>
+          <p:cNvPr id="12" name="Прямая со стрелкой 11"/>
+          <p:cNvCxnSpPr/>
+          <p:nvPr/>
+        </p:nvCxnSpPr>
+        <p:spPr>
+          <a:xfrm>
+            <a:off x="1181100" y="2345700"/>
+            <a:ext cx="0" cy="288000"/>
+          </a:xfrm>
+          <a:prstGeom prst="straightConnector1">
+            <a:avLst/>
+          </a:prstGeom>
+          <a:ln>
+            <a:tailEnd type="triangle"/>
+          </a:ln>
+        </p:spPr>
+        <p:style>
+          <a:lnRef idx="3">
+            <a:schemeClr val="accent6"/>
+          </a:lnRef>
+          <a:fillRef idx="0">
+            <a:schemeClr val="accent6"/>
+          </a:fillRef>
+          <a:effectRef idx="2">
+            <a:schemeClr val="accent6"/>
+          </a:effectRef>
+          <a:fontRef idx="minor">
+            <a:schemeClr val="tx1"/>
+          </a:fontRef>
+        </p:style>
+      </p:cxnSp>
+      <p:cxnSp>
+        <p:nvCxnSpPr>
+          <p:cNvPr id="14" name="Прямая со стрелкой 13"/>
+          <p:cNvCxnSpPr/>
+          <p:nvPr/>
+        </p:nvCxnSpPr>
+        <p:spPr>
+          <a:xfrm flipH="1" flipV="1">
+            <a:off x="673100" y="742950"/>
+            <a:ext cx="508000" cy="419100"/>
+          </a:xfrm>
+          <a:prstGeom prst="straightConnector1">
+            <a:avLst/>
+          </a:prstGeom>
+          <a:ln>
+            <a:gradFill>
+              <a:gsLst>
+                <a:gs pos="0">
+                  <a:schemeClr val="accent1">
+                    <a:lumMod val="5000"/>
+                    <a:lumOff val="95000"/>
+                  </a:schemeClr>
+                </a:gs>
+                <a:gs pos="74000">
+                  <a:schemeClr val="accent6">
+                    <a:lumMod val="60000"/>
+                    <a:lumOff val="40000"/>
+                  </a:schemeClr>
+                </a:gs>
+                <a:gs pos="83000">
+                  <a:schemeClr val="accent6">
+                    <a:lumMod val="75000"/>
+                  </a:schemeClr>
+                </a:gs>
+                <a:gs pos="100000">
+                  <a:srgbClr val="FF0000"/>
+                </a:gs>
+              </a:gsLst>
+              <a:lin ang="5400000" scaled="1"/>
+            </a:gradFill>
+            <a:tailEnd type="triangle"/>
+          </a:ln>
+        </p:spPr>
+        <p:style>
+          <a:lnRef idx="3">
+            <a:schemeClr val="accent6"/>
+          </a:lnRef>
+          <a:fillRef idx="0">
+            <a:schemeClr val="accent6"/>
+          </a:fillRef>
+          <a:effectRef idx="2">
+            <a:schemeClr val="accent6"/>
+          </a:effectRef>
+          <a:fontRef idx="minor">
+            <a:schemeClr val="tx1"/>
+          </a:fontRef>
+        </p:style>
+      </p:cxnSp>
+      <p:cxnSp>
+        <p:nvCxnSpPr>
+          <p:cNvPr id="15" name="Прямая со стрелкой 14"/>
+          <p:cNvCxnSpPr/>
+          <p:nvPr/>
+        </p:nvCxnSpPr>
+        <p:spPr>
+          <a:xfrm flipH="1" flipV="1">
+            <a:off x="673100" y="1765300"/>
+            <a:ext cx="508000" cy="419100"/>
+          </a:xfrm>
+          <a:prstGeom prst="straightConnector1">
+            <a:avLst/>
+          </a:prstGeom>
+          <a:ln>
+            <a:gradFill>
+              <a:gsLst>
+                <a:gs pos="0">
+                  <a:schemeClr val="accent1">
+                    <a:lumMod val="5000"/>
+                    <a:lumOff val="95000"/>
+                  </a:schemeClr>
+                </a:gs>
+                <a:gs pos="74000">
+                  <a:schemeClr val="accent6">
+                    <a:lumMod val="60000"/>
+                    <a:lumOff val="40000"/>
+                  </a:schemeClr>
+                </a:gs>
+                <a:gs pos="83000">
+                  <a:schemeClr val="accent6">
+                    <a:lumMod val="75000"/>
+                  </a:schemeClr>
+                </a:gs>
+                <a:gs pos="100000">
+                  <a:srgbClr val="FF0000"/>
+                </a:gs>
+              </a:gsLst>
+              <a:lin ang="5400000" scaled="1"/>
+            </a:gradFill>
+            <a:tailEnd type="triangle"/>
+          </a:ln>
+        </p:spPr>
+        <p:style>
+          <a:lnRef idx="3">
+            <a:schemeClr val="accent6"/>
+          </a:lnRef>
+          <a:fillRef idx="0">
+            <a:schemeClr val="accent6"/>
+          </a:fillRef>
+          <a:effectRef idx="2">
+            <a:schemeClr val="accent6"/>
+          </a:effectRef>
+          <a:fontRef idx="minor">
+            <a:schemeClr val="tx1"/>
+          </a:fontRef>
+        </p:style>
+      </p:cxnSp>
+    </p:spTree>
+    <p:extLst>
+      <p:ext uri="{BB962C8B-B14F-4D97-AF65-F5344CB8AC3E}">
+        <p14:creationId xmlns:p14="http://schemas.microsoft.com/office/powerpoint/2010/main" val="1953471660"/>
+      </p:ext>
+    </p:extLst>
+  </p:cSld>
+  <p:clrMapOvr>
+    <a:masterClrMapping/>
+  </p:clrMapOvr>
+  <p:timing>
+    <p:tnLst>
+      <p:par>
+        <p:cTn id="1" dur="indefinite" restart="never" nodeType="tmRoot">
+          <p:childTnLst>
+            <p:seq concurrent="1" nextAc="seek">
+              <p:cTn id="2" dur="indefinite" nodeType="mainSeq">
+                <p:childTnLst>
+                  <p:par>
+                    <p:cTn id="3" fill="hold">
+                      <p:stCondLst>
+                        <p:cond delay="indefinite"/>
+                      </p:stCondLst>
+                      <p:childTnLst>
+                        <p:par>
+                          <p:cTn id="4" fill="hold">
+                            <p:stCondLst>
+                              <p:cond delay="0"/>
+                            </p:stCondLst>
+                            <p:childTnLst>
+                              <p:par>
+                                <p:cTn id="5" presetID="1" presetClass="entr" presetSubtype="0" fill="hold" nodeType="clickEffect">
+                                  <p:stCondLst>
+                                    <p:cond delay="0"/>
+                                  </p:stCondLst>
+                                  <p:childTnLst>
+                                    <p:set>
+                                      <p:cBhvr>
+                                        <p:cTn id="6" dur="1" fill="hold">
+                                          <p:stCondLst>
+                                            <p:cond delay="0"/>
+                                          </p:stCondLst>
+                                        </p:cTn>
+                                        <p:tgtEl>
+                                          <p:spTgt spid="10"/>
+                                        </p:tgtEl>
+                                        <p:attrNameLst>
+                                          <p:attrName>style.visibility</p:attrName>
+                                        </p:attrNameLst>
+                                      </p:cBhvr>
+                                      <p:to>
+                                        <p:strVal val="visible"/>
+                                      </p:to>
+                                    </p:set>
+                                  </p:childTnLst>
+                                </p:cTn>
+                              </p:par>
+                            </p:childTnLst>
+                          </p:cTn>
+                        </p:par>
+                      </p:childTnLst>
+                    </p:cTn>
+                  </p:par>
+                  <p:par>
+                    <p:cTn id="7" fill="hold">
+                      <p:stCondLst>
+                        <p:cond delay="indefinite"/>
+                      </p:stCondLst>
+                      <p:childTnLst>
+                        <p:par>
+                          <p:cTn id="8" fill="hold">
+                            <p:stCondLst>
+                              <p:cond delay="0"/>
+                            </p:stCondLst>
+                            <p:childTnLst>
+                              <p:par>
+                                <p:cTn id="9" presetID="1" presetClass="entr" presetSubtype="0" fill="hold" nodeType="clickEffect">
+                                  <p:stCondLst>
+                                    <p:cond delay="0"/>
+                                  </p:stCondLst>
+                                  <p:childTnLst>
+                                    <p:set>
+                                      <p:cBhvr>
+                                        <p:cTn id="10" dur="1" fill="hold">
+                                          <p:stCondLst>
+                                            <p:cond delay="0"/>
+                                          </p:stCondLst>
+                                        </p:cTn>
+                                        <p:tgtEl>
+                                          <p:spTgt spid="14"/>
+                                        </p:tgtEl>
+                                        <p:attrNameLst>
+                                          <p:attrName>style.visibility</p:attrName>
+                                        </p:attrNameLst>
+                                      </p:cBhvr>
+                                      <p:to>
+                                        <p:strVal val="visible"/>
+                                      </p:to>
+                                    </p:set>
+                                  </p:childTnLst>
+                                </p:cTn>
+                              </p:par>
+                            </p:childTnLst>
+                          </p:cTn>
+                        </p:par>
+                      </p:childTnLst>
+                    </p:cTn>
+                  </p:par>
+                  <p:par>
+                    <p:cTn id="11" fill="hold">
+                      <p:stCondLst>
+                        <p:cond delay="indefinite"/>
+                      </p:stCondLst>
+                      <p:childTnLst>
+                        <p:par>
+                          <p:cTn id="12" fill="hold">
+                            <p:stCondLst>
+                              <p:cond delay="0"/>
+                            </p:stCondLst>
+                            <p:childTnLst>
+                              <p:par>
+                                <p:cTn id="13" presetID="1" presetClass="entr" presetSubtype="0" fill="hold" nodeType="clickEffect">
+                                  <p:stCondLst>
+                                    <p:cond delay="0"/>
+                                  </p:stCondLst>
+                                  <p:childTnLst>
+                                    <p:set>
+                                      <p:cBhvr>
+                                        <p:cTn id="14" dur="1" fill="hold">
+                                          <p:stCondLst>
+                                            <p:cond delay="0"/>
+                                          </p:stCondLst>
+                                        </p:cTn>
+                                        <p:tgtEl>
+                                          <p:spTgt spid="11"/>
+                                        </p:tgtEl>
+                                        <p:attrNameLst>
+                                          <p:attrName>style.visibility</p:attrName>
+                                        </p:attrNameLst>
+                                      </p:cBhvr>
+                                      <p:to>
+                                        <p:strVal val="visible"/>
+                                      </p:to>
+                                    </p:set>
+                                  </p:childTnLst>
+                                </p:cTn>
+                              </p:par>
+                            </p:childTnLst>
+                          </p:cTn>
+                        </p:par>
+                      </p:childTnLst>
+                    </p:cTn>
+                  </p:par>
+                  <p:par>
+                    <p:cTn id="15" fill="hold">
+                      <p:stCondLst>
+                        <p:cond delay="indefinite"/>
+                      </p:stCondLst>
+                      <p:childTnLst>
+                        <p:par>
+                          <p:cTn id="16" fill="hold">
+                            <p:stCondLst>
+                              <p:cond delay="0"/>
+                            </p:stCondLst>
+                            <p:childTnLst>
+                              <p:par>
+                                <p:cTn id="17" presetID="1" presetClass="entr" presetSubtype="0" fill="hold" nodeType="clickEffect">
+                                  <p:stCondLst>
+                                    <p:cond delay="0"/>
+                                  </p:stCondLst>
+                                  <p:childTnLst>
+                                    <p:set>
+                                      <p:cBhvr>
+                                        <p:cTn id="18" dur="1" fill="hold">
+                                          <p:stCondLst>
+                                            <p:cond delay="0"/>
+                                          </p:stCondLst>
+                                        </p:cTn>
+                                        <p:tgtEl>
+                                          <p:spTgt spid="15"/>
+                                        </p:tgtEl>
+                                        <p:attrNameLst>
+                                          <p:attrName>style.visibility</p:attrName>
+                                        </p:attrNameLst>
+                                      </p:cBhvr>
+                                      <p:to>
+                                        <p:strVal val="visible"/>
+                                      </p:to>
+                                    </p:set>
+                                  </p:childTnLst>
+                                </p:cTn>
+                              </p:par>
+                            </p:childTnLst>
+                          </p:cTn>
+                        </p:par>
+                      </p:childTnLst>
+                    </p:cTn>
+                  </p:par>
+                  <p:par>
+                    <p:cTn id="19" fill="hold">
+                      <p:stCondLst>
+                        <p:cond delay="indefinite"/>
+                      </p:stCondLst>
+                      <p:childTnLst>
+                        <p:par>
+                          <p:cTn id="20" fill="hold">
+                            <p:stCondLst>
+                              <p:cond delay="0"/>
+                            </p:stCondLst>
+                            <p:childTnLst>
+                              <p:par>
+                                <p:cTn id="21" presetID="1" presetClass="entr" presetSubtype="0" fill="hold" nodeType="clickEffect">
+                                  <p:stCondLst>
+                                    <p:cond delay="0"/>
+                                  </p:stCondLst>
+                                  <p:childTnLst>
+                                    <p:set>
+                                      <p:cBhvr>
+                                        <p:cTn id="22" dur="1" fill="hold">
+                                          <p:stCondLst>
+                                            <p:cond delay="0"/>
+                                          </p:stCondLst>
+                                        </p:cTn>
+                                        <p:tgtEl>
+                                          <p:spTgt spid="12"/>
+                                        </p:tgtEl>
+                                        <p:attrNameLst>
+                                          <p:attrName>style.visibility</p:attrName>
+                                        </p:attrNameLst>
+                                      </p:cBhvr>
+                                      <p:to>
+                                        <p:strVal val="visible"/>
+                                      </p:to>
+                                    </p:set>
+                                  </p:childTnLst>
+                                </p:cTn>
+                              </p:par>
+                            </p:childTnLst>
+                          </p:cTn>
+                        </p:par>
+                      </p:childTnLst>
+                    </p:cTn>
+                  </p:par>
+                </p:childTnLst>
+              </p:cTn>
+              <p:prevCondLst>
+                <p:cond evt="onPrev" delay="0">
+                  <p:tgtEl>
+                    <p:sldTgt/>
+                  </p:tgtEl>
+                </p:cond>
+              </p:prevCondLst>
+              <p:nextCondLst>
+                <p:cond evt="onNext" delay="0">
+                  <p:tgtEl>
+                    <p:sldTgt/>
+                  </p:tgtEl>
+                </p:cond>
+              </p:nextCondLst>
+            </p:seq>
+          </p:childTnLst>
+        </p:cTn>
+      </p:par>
+    </p:tnLst>
+  </p:timing>
+</p:sld>
+</file>
+
+<file path=ppt/slides/slide15.xml><?xml version="1.0" encoding="utf-8"?>
+<p:sld xmlns:a="http://schemas.openxmlformats.org/drawingml/2006/main" xmlns:r="http://schemas.openxmlformats.org/officeDocument/2006/relationships" xmlns:p="http://schemas.openxmlformats.org/presentationml/2006/main">
+  <p:cSld>
+    <p:spTree>
+      <p:nvGrpSpPr>
+        <p:cNvPr id="1" name=""/>
+        <p:cNvGrpSpPr/>
+        <p:nvPr/>
+      </p:nvGrpSpPr>
+      <p:grpSpPr>
+        <a:xfrm>
+          <a:off x="0" y="0"/>
+          <a:ext cx="0" cy="0"/>
+          <a:chOff x="0" y="0"/>
+          <a:chExt cx="0" cy="0"/>
+        </a:xfrm>
+      </p:grpSpPr>
+      <p:sp>
+        <p:nvSpPr>
+          <p:cNvPr id="2" name="Заголовок 1"/>
+          <p:cNvSpPr>
+            <a:spLocks noGrp="1"/>
+          </p:cNvSpPr>
+          <p:nvPr>
+            <p:ph type="title"/>
+          </p:nvPr>
+        </p:nvSpPr>
+        <p:spPr>
+          <a:xfrm>
+            <a:off x="1001712" y="194732"/>
+            <a:ext cx="8534400" cy="1507067"/>
+          </a:xfrm>
+        </p:spPr>
+        <p:txBody>
+          <a:bodyPr/>
+          <a:lstStyle/>
+          <a:p>
+            <a:r>
+              <a:rPr lang="ru-RU" dirty="0" smtClean="0"/>
+              <a:t>Ключевые слова </a:t>
+            </a:r>
+            <a:r>
+              <a:rPr lang="en-US" dirty="0" smtClean="0"/>
+              <a:t>async/await</a:t>
+            </a:r>
+            <a:endParaRPr lang="ru-RU" dirty="0"/>
+          </a:p>
+        </p:txBody>
+      </p:sp>
+      <p:sp>
+        <p:nvSpPr>
+          <p:cNvPr id="3" name="Объект 2"/>
+          <p:cNvSpPr>
+            <a:spLocks noGrp="1"/>
+          </p:cNvSpPr>
+          <p:nvPr>
+            <p:ph idx="1"/>
+          </p:nvPr>
+        </p:nvSpPr>
+        <p:spPr>
+          <a:xfrm>
+            <a:off x="900112" y="2548464"/>
+            <a:ext cx="8534400" cy="1515535"/>
+          </a:xfrm>
+        </p:spPr>
+        <p:txBody>
+          <a:bodyPr>
+            <a:normAutofit fontScale="85000" lnSpcReduction="10000"/>
+          </a:bodyPr>
+          <a:lstStyle/>
+          <a:p>
+            <a:pPr marL="457200" indent="-457200">
+              <a:buFont typeface="+mj-lt"/>
+              <a:buAutoNum type="arabicPeriod"/>
+            </a:pPr>
+            <a:r>
+              <a:rPr lang="ru-RU" sz="2100" dirty="0" smtClean="0"/>
+              <a:t>Разрешает использовать </a:t>
+            </a:r>
+            <a:r>
+              <a:rPr lang="en-US" sz="2100" dirty="0" smtClean="0"/>
+              <a:t>await</a:t>
+            </a:r>
+            <a:endParaRPr lang="ru-RU" sz="2100" dirty="0" smtClean="0"/>
+          </a:p>
+          <a:p>
+            <a:pPr marL="457200" indent="-457200">
+              <a:buFont typeface="+mj-lt"/>
+              <a:buAutoNum type="arabicPeriod"/>
+            </a:pPr>
+            <a:r>
+              <a:rPr lang="ru-RU" sz="2100" dirty="0" smtClean="0"/>
+              <a:t>Позволяет передавать результат метода или исключение вверх по стеку</a:t>
+            </a:r>
+          </a:p>
+          <a:p>
+            <a:pPr marL="457200" indent="-457200">
+              <a:buFont typeface="+mj-lt"/>
+              <a:buAutoNum type="arabicPeriod"/>
+            </a:pPr>
+            <a:r>
+              <a:rPr lang="ru-RU" sz="2100" dirty="0" smtClean="0"/>
+              <a:t>Для такого метода компилятора сгенерирует машину состояний</a:t>
+            </a:r>
+            <a:endParaRPr lang="en-US" sz="2100" dirty="0" smtClean="0"/>
+          </a:p>
+          <a:p>
+            <a:endParaRPr lang="en-US" dirty="0" smtClean="0"/>
+          </a:p>
+        </p:txBody>
+      </p:sp>
+      <p:sp>
+        <p:nvSpPr>
+          <p:cNvPr id="4" name="Объект 2"/>
+          <p:cNvSpPr txBox="1">
+            <a:spLocks/>
+          </p:cNvSpPr>
+          <p:nvPr/>
+        </p:nvSpPr>
+        <p:spPr>
+          <a:xfrm>
+            <a:off x="900112" y="4558495"/>
+            <a:ext cx="8534400" cy="973665"/>
+          </a:xfrm>
+          <a:prstGeom prst="rect">
+            <a:avLst/>
+          </a:prstGeom>
+        </p:spPr>
+        <p:txBody>
+          <a:bodyPr vert="horz" lIns="91440" tIns="45720" rIns="91440" bIns="45720" rtlCol="0" anchor="ctr">
+            <a:noAutofit/>
+          </a:bodyPr>
+          <a:lstStyle>
+            <a:lvl1pPr marL="285750" indent="-285750" algn="l" defTabSz="457200" rtl="0" eaLnBrk="1" latinLnBrk="0" hangingPunct="1">
+              <a:spcBef>
+                <a:spcPct val="20000"/>
+              </a:spcBef>
+              <a:spcAft>
+                <a:spcPts val="600"/>
+              </a:spcAft>
+              <a:buClr>
+                <a:schemeClr val="tx1"/>
+              </a:buClr>
+              <a:buSzPct val="80000"/>
+              <a:buFont typeface="Wingdings 3" panose="05040102010807070707" pitchFamily="18" charset="2"/>
+              <a:buChar char=""/>
+              <a:defRPr sz="2000" kern="1200" cap="none">
+                <a:solidFill>
+                  <a:schemeClr val="bg2">
+                    <a:lumMod val="75000"/>
+                  </a:schemeClr>
+                </a:solidFill>
+                <a:effectLst/>
+                <a:latin typeface="+mn-lt"/>
+                <a:ea typeface="+mn-ea"/>
+                <a:cs typeface="+mn-cs"/>
+              </a:defRPr>
+            </a:lvl1pPr>
+            <a:lvl2pPr marL="742950" indent="-285750" algn="l" defTabSz="457200" rtl="0" eaLnBrk="1" latinLnBrk="0" hangingPunct="1">
+              <a:spcBef>
+                <a:spcPct val="20000"/>
+              </a:spcBef>
+              <a:spcAft>
+                <a:spcPts val="600"/>
+              </a:spcAft>
+              <a:buClr>
+                <a:schemeClr val="tx1"/>
+              </a:buClr>
+              <a:buSzPct val="80000"/>
+              <a:buFont typeface="Wingdings 3" panose="05040102010807070707" pitchFamily="18" charset="2"/>
+              <a:buChar char=""/>
+              <a:defRPr sz="1800" kern="1200" cap="none">
+                <a:solidFill>
+                  <a:schemeClr val="bg2">
+                    <a:lumMod val="75000"/>
+                  </a:schemeClr>
+                </a:solidFill>
+                <a:effectLst/>
+                <a:latin typeface="+mn-lt"/>
+                <a:ea typeface="+mn-ea"/>
+                <a:cs typeface="+mn-cs"/>
+              </a:defRPr>
+            </a:lvl2pPr>
+            <a:lvl3pPr marL="1200150" indent="-285750" algn="l" defTabSz="457200" rtl="0" eaLnBrk="1" latinLnBrk="0" hangingPunct="1">
+              <a:spcBef>
+                <a:spcPct val="20000"/>
+              </a:spcBef>
+              <a:spcAft>
+                <a:spcPts val="600"/>
+              </a:spcAft>
+              <a:buClr>
+                <a:schemeClr val="tx1"/>
+              </a:buClr>
+              <a:buSzPct val="80000"/>
+              <a:buFont typeface="Wingdings 3" panose="05040102010807070707" pitchFamily="18" charset="2"/>
+              <a:buChar char=""/>
+              <a:defRPr sz="1600" kern="1200" cap="none">
+                <a:solidFill>
+                  <a:schemeClr val="bg2">
+                    <a:lumMod val="75000"/>
+                  </a:schemeClr>
+                </a:solidFill>
+                <a:effectLst/>
+                <a:latin typeface="+mn-lt"/>
+                <a:ea typeface="+mn-ea"/>
+                <a:cs typeface="+mn-cs"/>
+              </a:defRPr>
+            </a:lvl3pPr>
+            <a:lvl4pPr marL="1543050" indent="-171450" algn="l" defTabSz="457200" rtl="0" eaLnBrk="1" latinLnBrk="0" hangingPunct="1">
+              <a:spcBef>
+                <a:spcPct val="20000"/>
+              </a:spcBef>
+              <a:spcAft>
+                <a:spcPts val="600"/>
+              </a:spcAft>
+              <a:buClr>
+                <a:schemeClr val="tx1"/>
+              </a:buClr>
+              <a:buSzPct val="80000"/>
+              <a:buFont typeface="Wingdings 3" panose="05040102010807070707" pitchFamily="18" charset="2"/>
+              <a:buChar char=""/>
+              <a:defRPr sz="1400" kern="1200" cap="none">
+                <a:solidFill>
+                  <a:schemeClr val="bg2">
+                    <a:lumMod val="75000"/>
+                  </a:schemeClr>
+                </a:solidFill>
+                <a:effectLst/>
+                <a:latin typeface="+mn-lt"/>
+                <a:ea typeface="+mn-ea"/>
+                <a:cs typeface="+mn-cs"/>
+              </a:defRPr>
+            </a:lvl4pPr>
+            <a:lvl5pPr marL="2000250" indent="-171450" algn="l" defTabSz="457200" rtl="0" eaLnBrk="1" latinLnBrk="0" hangingPunct="1">
+              <a:spcBef>
+                <a:spcPct val="20000"/>
+              </a:spcBef>
+              <a:spcAft>
+                <a:spcPts val="600"/>
+              </a:spcAft>
+              <a:buClr>
+                <a:schemeClr val="tx1"/>
+              </a:buClr>
+              <a:buSzPct val="80000"/>
+              <a:buFont typeface="Wingdings 3" panose="05040102010807070707" pitchFamily="18" charset="2"/>
+              <a:buChar char=""/>
+              <a:defRPr sz="1400" kern="1200" cap="none">
+                <a:solidFill>
+                  <a:schemeClr val="bg2">
+                    <a:lumMod val="75000"/>
+                  </a:schemeClr>
+                </a:solidFill>
+                <a:effectLst/>
+                <a:latin typeface="+mn-lt"/>
+                <a:ea typeface="+mn-ea"/>
+                <a:cs typeface="+mn-cs"/>
+              </a:defRPr>
+            </a:lvl5pPr>
+            <a:lvl6pPr marL="2514600" indent="-228600" algn="l" defTabSz="457200" rtl="0" eaLnBrk="1" latinLnBrk="0" hangingPunct="1">
+              <a:spcBef>
+                <a:spcPct val="20000"/>
+              </a:spcBef>
+              <a:spcAft>
+                <a:spcPts val="600"/>
+              </a:spcAft>
+              <a:buClr>
+                <a:schemeClr val="tx1"/>
+              </a:buClr>
+              <a:buSzPct val="80000"/>
+              <a:buFont typeface="Wingdings 3" panose="05040102010807070707" pitchFamily="18" charset="2"/>
+              <a:buChar char=""/>
+              <a:defRPr sz="1400" kern="1200" cap="none">
+                <a:solidFill>
+                  <a:schemeClr val="bg2">
+                    <a:lumMod val="75000"/>
+                  </a:schemeClr>
+                </a:solidFill>
+                <a:effectLst/>
+                <a:latin typeface="+mn-lt"/>
+                <a:ea typeface="+mn-ea"/>
+                <a:cs typeface="+mn-cs"/>
+              </a:defRPr>
+            </a:lvl6pPr>
+            <a:lvl7pPr marL="2971800" indent="-228600" algn="l" defTabSz="457200" rtl="0" eaLnBrk="1" latinLnBrk="0" hangingPunct="1">
+              <a:spcBef>
+                <a:spcPct val="20000"/>
+              </a:spcBef>
+              <a:spcAft>
+                <a:spcPts val="600"/>
+              </a:spcAft>
+              <a:buClr>
+                <a:schemeClr val="tx1"/>
+              </a:buClr>
+              <a:buSzPct val="80000"/>
+              <a:buFont typeface="Wingdings 3" panose="05040102010807070707" pitchFamily="18" charset="2"/>
+              <a:buChar char=""/>
+              <a:defRPr sz="1400" kern="1200" cap="none">
+                <a:solidFill>
+                  <a:schemeClr val="bg2">
+                    <a:lumMod val="75000"/>
+                  </a:schemeClr>
+                </a:solidFill>
+                <a:effectLst/>
+                <a:latin typeface="+mn-lt"/>
+                <a:ea typeface="+mn-ea"/>
+                <a:cs typeface="+mn-cs"/>
+              </a:defRPr>
+            </a:lvl7pPr>
+            <a:lvl8pPr marL="3429000" indent="-228600" algn="l" defTabSz="457200" rtl="0" eaLnBrk="1" latinLnBrk="0" hangingPunct="1">
+              <a:spcBef>
+                <a:spcPct val="20000"/>
+              </a:spcBef>
+              <a:spcAft>
+                <a:spcPts val="600"/>
+              </a:spcAft>
+              <a:buClr>
+                <a:schemeClr val="tx1"/>
+              </a:buClr>
+              <a:buSzPct val="80000"/>
+              <a:buFont typeface="Wingdings 3" panose="05040102010807070707" pitchFamily="18" charset="2"/>
+              <a:buChar char=""/>
+              <a:defRPr sz="1400" kern="1200" cap="none">
+                <a:solidFill>
+                  <a:schemeClr val="bg2">
+                    <a:lumMod val="75000"/>
+                  </a:schemeClr>
+                </a:solidFill>
+                <a:effectLst/>
+                <a:latin typeface="+mn-lt"/>
+                <a:ea typeface="+mn-ea"/>
+                <a:cs typeface="+mn-cs"/>
+              </a:defRPr>
+            </a:lvl8pPr>
+            <a:lvl9pPr marL="3886200" indent="-228600" algn="l" defTabSz="457200" rtl="0" eaLnBrk="1" latinLnBrk="0" hangingPunct="1">
+              <a:spcBef>
+                <a:spcPct val="20000"/>
+              </a:spcBef>
+              <a:spcAft>
+                <a:spcPts val="600"/>
+              </a:spcAft>
+              <a:buClr>
+                <a:schemeClr val="tx1"/>
+              </a:buClr>
+              <a:buSzPct val="80000"/>
+              <a:buFont typeface="Wingdings 3" panose="05040102010807070707" pitchFamily="18" charset="2"/>
+              <a:buChar char=""/>
+              <a:defRPr sz="1400" kern="1200" cap="none">
+                <a:solidFill>
+                  <a:schemeClr val="bg2">
+                    <a:lumMod val="75000"/>
+                  </a:schemeClr>
+                </a:solidFill>
+                <a:effectLst/>
+                <a:latin typeface="+mn-lt"/>
+                <a:ea typeface="+mn-ea"/>
+                <a:cs typeface="+mn-cs"/>
+              </a:defRPr>
+            </a:lvl9pPr>
+          </a:lstStyle>
+          <a:p>
+            <a:pPr marL="457200" indent="-457200">
+              <a:buFont typeface="+mj-lt"/>
+              <a:buAutoNum type="arabicPeriod"/>
+            </a:pPr>
+            <a:r>
+              <a:rPr lang="ru-RU" sz="1800" dirty="0" smtClean="0"/>
+              <a:t>Вставляет точку </a:t>
+            </a:r>
+            <a:r>
+              <a:rPr lang="ru-RU" sz="1800" b="1" dirty="0" smtClean="0"/>
+              <a:t>возможного</a:t>
+            </a:r>
+            <a:r>
+              <a:rPr lang="ru-RU" sz="1800" dirty="0" smtClean="0"/>
+              <a:t> прерывания/возобновления метода</a:t>
+            </a:r>
+          </a:p>
+          <a:p>
+            <a:pPr marL="457200" indent="-457200">
+              <a:buFont typeface="+mj-lt"/>
+              <a:buAutoNum type="arabicPeriod"/>
+            </a:pPr>
+            <a:r>
+              <a:rPr lang="ru-RU" sz="1800" dirty="0" smtClean="0"/>
+              <a:t>Извлекает результат или исключение из таска</a:t>
+            </a:r>
+            <a:endParaRPr lang="en-US" sz="1800" dirty="0" smtClean="0"/>
+          </a:p>
+        </p:txBody>
+      </p:sp>
+      <p:sp>
+        <p:nvSpPr>
+          <p:cNvPr id="5" name="TextBox 4"/>
+          <p:cNvSpPr txBox="1"/>
+          <p:nvPr/>
+        </p:nvSpPr>
+        <p:spPr>
+          <a:xfrm>
+            <a:off x="469900" y="1879600"/>
+            <a:ext cx="3162300" cy="523220"/>
+          </a:xfrm>
+          <a:prstGeom prst="rect">
+            <a:avLst/>
+          </a:prstGeom>
+          <a:noFill/>
+        </p:spPr>
+        <p:txBody>
+          <a:bodyPr wrap="square" rtlCol="0">
+            <a:spAutoFit/>
+          </a:bodyPr>
+          <a:lstStyle/>
+          <a:p>
+            <a:r>
+              <a:rPr lang="en-US" sz="2800" dirty="0"/>
+              <a:t>a</a:t>
+            </a:r>
+            <a:r>
+              <a:rPr lang="en-US" sz="2800" dirty="0" smtClean="0"/>
+              <a:t>sync</a:t>
+            </a:r>
+            <a:r>
+              <a:rPr lang="en-US" dirty="0" smtClean="0"/>
+              <a:t>:</a:t>
+            </a:r>
+            <a:endParaRPr lang="ru-RU" dirty="0"/>
+          </a:p>
+        </p:txBody>
+      </p:sp>
+      <p:sp>
+        <p:nvSpPr>
+          <p:cNvPr id="6" name="TextBox 5"/>
+          <p:cNvSpPr txBox="1"/>
+          <p:nvPr/>
+        </p:nvSpPr>
+        <p:spPr>
+          <a:xfrm>
+            <a:off x="469900" y="4209643"/>
+            <a:ext cx="3162300" cy="523220"/>
+          </a:xfrm>
+          <a:prstGeom prst="rect">
+            <a:avLst/>
+          </a:prstGeom>
+          <a:noFill/>
+        </p:spPr>
+        <p:txBody>
+          <a:bodyPr wrap="square" rtlCol="0">
+            <a:spAutoFit/>
+          </a:bodyPr>
+          <a:lstStyle/>
+          <a:p>
+            <a:r>
+              <a:rPr lang="en-US" sz="2800" dirty="0" smtClean="0"/>
+              <a:t>await</a:t>
+            </a:r>
+            <a:r>
+              <a:rPr lang="en-US" dirty="0" smtClean="0"/>
+              <a:t>:</a:t>
+            </a:r>
+            <a:endParaRPr lang="ru-RU" dirty="0"/>
+          </a:p>
+        </p:txBody>
+      </p:sp>
+    </p:spTree>
+    <p:extLst>
+      <p:ext uri="{BB962C8B-B14F-4D97-AF65-F5344CB8AC3E}">
+        <p14:creationId xmlns:p14="http://schemas.microsoft.com/office/powerpoint/2010/main" val="2203580670"/>
+      </p:ext>
+    </p:extLst>
+  </p:cSld>
+  <p:clrMapOvr>
+    <a:masterClrMapping/>
+  </p:clrMapOvr>
+  <p:timing>
+    <p:tnLst>
+      <p:par>
+        <p:cTn id="1" dur="indefinite" restart="never" nodeType="tmRoot">
+          <p:childTnLst>
+            <p:seq concurrent="1" nextAc="seek">
+              <p:cTn id="2" dur="indefinite" nodeType="mainSeq">
+                <p:childTnLst>
+                  <p:par>
+                    <p:cTn id="3" fill="hold">
+                      <p:stCondLst>
+                        <p:cond delay="indefinite"/>
+                      </p:stCondLst>
+                      <p:childTnLst>
+                        <p:par>
+                          <p:cTn id="4" fill="hold">
+                            <p:stCondLst>
+                              <p:cond delay="0"/>
+                            </p:stCondLst>
+                            <p:childTnLst>
+                              <p:par>
+                                <p:cTn id="5" presetID="42" presetClass="entr" presetSubtype="0" fill="hold" grpId="0" nodeType="clickEffect">
+                                  <p:stCondLst>
+                                    <p:cond delay="0"/>
+                                  </p:stCondLst>
+                                  <p:childTnLst>
+                                    <p:set>
+                                      <p:cBhvr>
+                                        <p:cTn id="6" dur="1" fill="hold">
+                                          <p:stCondLst>
+                                            <p:cond delay="0"/>
+                                          </p:stCondLst>
+                                        </p:cTn>
+                                        <p:tgtEl>
+                                          <p:spTgt spid="3">
+                                            <p:txEl>
+                                              <p:pRg st="0" end="0"/>
+                                            </p:txEl>
+                                          </p:spTgt>
+                                        </p:tgtEl>
+                                        <p:attrNameLst>
+                                          <p:attrName>style.visibility</p:attrName>
+                                        </p:attrNameLst>
+                                      </p:cBhvr>
+                                      <p:to>
+                                        <p:strVal val="visible"/>
+                                      </p:to>
+                                    </p:set>
+                                    <p:animEffect transition="in" filter="fade">
+                                      <p:cBhvr>
+                                        <p:cTn id="7" dur="1000"/>
+                                        <p:tgtEl>
+                                          <p:spTgt spid="3">
+                                            <p:txEl>
+                                              <p:pRg st="0" end="0"/>
+                                            </p:txEl>
+                                          </p:spTgt>
+                                        </p:tgtEl>
+                                      </p:cBhvr>
+                                    </p:animEffect>
+                                    <p:anim calcmode="lin" valueType="num">
+                                      <p:cBhvr>
+                                        <p:cTn id="8" dur="1000" fill="hold"/>
+                                        <p:tgtEl>
+                                          <p:spTgt spid="3">
+                                            <p:txEl>
+                                              <p:pRg st="0" end="0"/>
+                                            </p:txEl>
+                                          </p:spTgt>
+                                        </p:tgtEl>
+                                        <p:attrNameLst>
+                                          <p:attrName>ppt_x</p:attrName>
+                                        </p:attrNameLst>
+                                      </p:cBhvr>
+                                      <p:tavLst>
+                                        <p:tav tm="0">
+                                          <p:val>
+                                            <p:strVal val="#ppt_x"/>
+                                          </p:val>
+                                        </p:tav>
+                                        <p:tav tm="100000">
+                                          <p:val>
+                                            <p:strVal val="#ppt_x"/>
+                                          </p:val>
+                                        </p:tav>
+                                      </p:tavLst>
+                                    </p:anim>
+                                    <p:anim calcmode="lin" valueType="num">
+                                      <p:cBhvr>
+                                        <p:cTn id="9" dur="1000" fill="hold"/>
+                                        <p:tgtEl>
+                                          <p:spTgt spid="3">
+                                            <p:txEl>
+                                              <p:pRg st="0" end="0"/>
+                                            </p:txEl>
+                                          </p:spTgt>
+                                        </p:tgtEl>
+                                        <p:attrNameLst>
+                                          <p:attrName>ppt_y</p:attrName>
+                                        </p:attrNameLst>
+                                      </p:cBhvr>
+                                      <p:tavLst>
+                                        <p:tav tm="0">
+                                          <p:val>
+                                            <p:strVal val="#ppt_y+.1"/>
+                                          </p:val>
+                                        </p:tav>
+                                        <p:tav tm="100000">
+                                          <p:val>
+                                            <p:strVal val="#ppt_y"/>
+                                          </p:val>
+                                        </p:tav>
+                                      </p:tavLst>
+                                    </p:anim>
+                                  </p:childTnLst>
+                                </p:cTn>
+                              </p:par>
+                            </p:childTnLst>
+                          </p:cTn>
+                        </p:par>
+                      </p:childTnLst>
+                    </p:cTn>
+                  </p:par>
+                  <p:par>
+                    <p:cTn id="10" fill="hold">
+                      <p:stCondLst>
+                        <p:cond delay="indefinite"/>
+                      </p:stCondLst>
+                      <p:childTnLst>
+                        <p:par>
+                          <p:cTn id="11" fill="hold">
+                            <p:stCondLst>
+                              <p:cond delay="0"/>
+                            </p:stCondLst>
+                            <p:childTnLst>
+                              <p:par>
+                                <p:cTn id="12" presetID="42" presetClass="entr" presetSubtype="0" fill="hold" grpId="0" nodeType="clickEffect">
+                                  <p:stCondLst>
+                                    <p:cond delay="0"/>
+                                  </p:stCondLst>
+                                  <p:childTnLst>
+                                    <p:set>
+                                      <p:cBhvr>
+                                        <p:cTn id="13" dur="1" fill="hold">
+                                          <p:stCondLst>
+                                            <p:cond delay="0"/>
+                                          </p:stCondLst>
+                                        </p:cTn>
+                                        <p:tgtEl>
+                                          <p:spTgt spid="3">
+                                            <p:txEl>
+                                              <p:pRg st="1" end="1"/>
+                                            </p:txEl>
+                                          </p:spTgt>
+                                        </p:tgtEl>
+                                        <p:attrNameLst>
+                                          <p:attrName>style.visibility</p:attrName>
+                                        </p:attrNameLst>
+                                      </p:cBhvr>
+                                      <p:to>
+                                        <p:strVal val="visible"/>
+                                      </p:to>
+                                    </p:set>
+                                    <p:animEffect transition="in" filter="fade">
+                                      <p:cBhvr>
+                                        <p:cTn id="14" dur="1000"/>
+                                        <p:tgtEl>
+                                          <p:spTgt spid="3">
+                                            <p:txEl>
+                                              <p:pRg st="1" end="1"/>
+                                            </p:txEl>
+                                          </p:spTgt>
+                                        </p:tgtEl>
+                                      </p:cBhvr>
+                                    </p:animEffect>
+                                    <p:anim calcmode="lin" valueType="num">
+                                      <p:cBhvr>
+                                        <p:cTn id="15" dur="1000" fill="hold"/>
+                                        <p:tgtEl>
+                                          <p:spTgt spid="3">
+                                            <p:txEl>
+                                              <p:pRg st="1" end="1"/>
+                                            </p:txEl>
+                                          </p:spTgt>
+                                        </p:tgtEl>
+                                        <p:attrNameLst>
+                                          <p:attrName>ppt_x</p:attrName>
+                                        </p:attrNameLst>
+                                      </p:cBhvr>
+                                      <p:tavLst>
+                                        <p:tav tm="0">
+                                          <p:val>
+                                            <p:strVal val="#ppt_x"/>
+                                          </p:val>
+                                        </p:tav>
+                                        <p:tav tm="100000">
+                                          <p:val>
+                                            <p:strVal val="#ppt_x"/>
+                                          </p:val>
+                                        </p:tav>
+                                      </p:tavLst>
+                                    </p:anim>
+                                    <p:anim calcmode="lin" valueType="num">
+                                      <p:cBhvr>
+                                        <p:cTn id="16" dur="1000" fill="hold"/>
+                                        <p:tgtEl>
+                                          <p:spTgt spid="3">
+                                            <p:txEl>
+                                              <p:pRg st="1" end="1"/>
+                                            </p:txEl>
+                                          </p:spTgt>
+                                        </p:tgtEl>
+                                        <p:attrNameLst>
+                                          <p:attrName>ppt_y</p:attrName>
+                                        </p:attrNameLst>
+                                      </p:cBhvr>
+                                      <p:tavLst>
+                                        <p:tav tm="0">
+                                          <p:val>
+                                            <p:strVal val="#ppt_y+.1"/>
+                                          </p:val>
+                                        </p:tav>
+                                        <p:tav tm="100000">
+                                          <p:val>
+                                            <p:strVal val="#ppt_y"/>
+                                          </p:val>
+                                        </p:tav>
+                                      </p:tavLst>
+                                    </p:anim>
+                                  </p:childTnLst>
+                                </p:cTn>
+                              </p:par>
+                            </p:childTnLst>
+                          </p:cTn>
+                        </p:par>
+                      </p:childTnLst>
+                    </p:cTn>
+                  </p:par>
+                  <p:par>
+                    <p:cTn id="17" fill="hold">
+                      <p:stCondLst>
+                        <p:cond delay="indefinite"/>
+                      </p:stCondLst>
+                      <p:childTnLst>
+                        <p:par>
+                          <p:cTn id="18" fill="hold">
+                            <p:stCondLst>
+                              <p:cond delay="0"/>
+                            </p:stCondLst>
+                            <p:childTnLst>
+                              <p:par>
+                                <p:cTn id="19" presetID="42" presetClass="entr" presetSubtype="0" fill="hold" grpId="0" nodeType="clickEffect">
+                                  <p:stCondLst>
+                                    <p:cond delay="0"/>
+                                  </p:stCondLst>
+                                  <p:childTnLst>
+                                    <p:set>
+                                      <p:cBhvr>
+                                        <p:cTn id="20" dur="1" fill="hold">
+                                          <p:stCondLst>
+                                            <p:cond delay="0"/>
+                                          </p:stCondLst>
+                                        </p:cTn>
+                                        <p:tgtEl>
+                                          <p:spTgt spid="3">
+                                            <p:txEl>
+                                              <p:pRg st="2" end="2"/>
+                                            </p:txEl>
+                                          </p:spTgt>
+                                        </p:tgtEl>
+                                        <p:attrNameLst>
+                                          <p:attrName>style.visibility</p:attrName>
+                                        </p:attrNameLst>
+                                      </p:cBhvr>
+                                      <p:to>
+                                        <p:strVal val="visible"/>
+                                      </p:to>
+                                    </p:set>
+                                    <p:animEffect transition="in" filter="fade">
+                                      <p:cBhvr>
+                                        <p:cTn id="21" dur="1000"/>
+                                        <p:tgtEl>
+                                          <p:spTgt spid="3">
+                                            <p:txEl>
+                                              <p:pRg st="2" end="2"/>
+                                            </p:txEl>
+                                          </p:spTgt>
+                                        </p:tgtEl>
+                                      </p:cBhvr>
+                                    </p:animEffect>
+                                    <p:anim calcmode="lin" valueType="num">
+                                      <p:cBhvr>
+                                        <p:cTn id="22" dur="1000" fill="hold"/>
+                                        <p:tgtEl>
+                                          <p:spTgt spid="3">
+                                            <p:txEl>
+                                              <p:pRg st="2" end="2"/>
+                                            </p:txEl>
+                                          </p:spTgt>
+                                        </p:tgtEl>
+                                        <p:attrNameLst>
+                                          <p:attrName>ppt_x</p:attrName>
+                                        </p:attrNameLst>
+                                      </p:cBhvr>
+                                      <p:tavLst>
+                                        <p:tav tm="0">
+                                          <p:val>
+                                            <p:strVal val="#ppt_x"/>
+                                          </p:val>
+                                        </p:tav>
+                                        <p:tav tm="100000">
+                                          <p:val>
+                                            <p:strVal val="#ppt_x"/>
+                                          </p:val>
+                                        </p:tav>
+                                      </p:tavLst>
+                                    </p:anim>
+                                    <p:anim calcmode="lin" valueType="num">
+                                      <p:cBhvr>
+                                        <p:cTn id="23" dur="1000" fill="hold"/>
+                                        <p:tgtEl>
+                                          <p:spTgt spid="3">
+                                            <p:txEl>
+                                              <p:pRg st="2" end="2"/>
+                                            </p:txEl>
+                                          </p:spTgt>
+                                        </p:tgtEl>
+                                        <p:attrNameLst>
+                                          <p:attrName>ppt_y</p:attrName>
+                                        </p:attrNameLst>
+                                      </p:cBhvr>
+                                      <p:tavLst>
+                                        <p:tav tm="0">
+                                          <p:val>
+                                            <p:strVal val="#ppt_y+.1"/>
+                                          </p:val>
+                                        </p:tav>
+                                        <p:tav tm="100000">
+                                          <p:val>
+                                            <p:strVal val="#ppt_y"/>
+                                          </p:val>
+                                        </p:tav>
+                                      </p:tavLst>
+                                    </p:anim>
+                                  </p:childTnLst>
+                                </p:cTn>
+                              </p:par>
+                            </p:childTnLst>
+                          </p:cTn>
+                        </p:par>
+                      </p:childTnLst>
+                    </p:cTn>
+                  </p:par>
+                  <p:par>
+                    <p:cTn id="24" fill="hold">
+                      <p:stCondLst>
+                        <p:cond delay="indefinite"/>
+                      </p:stCondLst>
+                      <p:childTnLst>
+                        <p:par>
+                          <p:cTn id="25" fill="hold">
+                            <p:stCondLst>
+                              <p:cond delay="0"/>
+                            </p:stCondLst>
+                            <p:childTnLst>
+                              <p:par>
+                                <p:cTn id="26" presetID="42" presetClass="entr" presetSubtype="0" fill="hold" nodeType="clickEffect">
+                                  <p:stCondLst>
+                                    <p:cond delay="0"/>
+                                  </p:stCondLst>
+                                  <p:childTnLst>
+                                    <p:set>
+                                      <p:cBhvr>
+                                        <p:cTn id="27" dur="1" fill="hold">
+                                          <p:stCondLst>
+                                            <p:cond delay="0"/>
+                                          </p:stCondLst>
+                                        </p:cTn>
+                                        <p:tgtEl>
+                                          <p:spTgt spid="4">
+                                            <p:txEl>
+                                              <p:pRg st="0" end="0"/>
+                                            </p:txEl>
+                                          </p:spTgt>
+                                        </p:tgtEl>
+                                        <p:attrNameLst>
+                                          <p:attrName>style.visibility</p:attrName>
+                                        </p:attrNameLst>
+                                      </p:cBhvr>
+                                      <p:to>
+                                        <p:strVal val="visible"/>
+                                      </p:to>
+                                    </p:set>
+                                    <p:animEffect transition="in" filter="fade">
+                                      <p:cBhvr>
+                                        <p:cTn id="28" dur="1000"/>
+                                        <p:tgtEl>
+                                          <p:spTgt spid="4">
+                                            <p:txEl>
+                                              <p:pRg st="0" end="0"/>
+                                            </p:txEl>
+                                          </p:spTgt>
+                                        </p:tgtEl>
+                                      </p:cBhvr>
+                                    </p:animEffect>
+                                    <p:anim calcmode="lin" valueType="num">
+                                      <p:cBhvr>
+                                        <p:cTn id="29" dur="1000" fill="hold"/>
+                                        <p:tgtEl>
+                                          <p:spTgt spid="4">
+                                            <p:txEl>
+                                              <p:pRg st="0" end="0"/>
+                                            </p:txEl>
+                                          </p:spTgt>
+                                        </p:tgtEl>
+                                        <p:attrNameLst>
+                                          <p:attrName>ppt_x</p:attrName>
+                                        </p:attrNameLst>
+                                      </p:cBhvr>
+                                      <p:tavLst>
+                                        <p:tav tm="0">
+                                          <p:val>
+                                            <p:strVal val="#ppt_x"/>
+                                          </p:val>
+                                        </p:tav>
+                                        <p:tav tm="100000">
+                                          <p:val>
+                                            <p:strVal val="#ppt_x"/>
+                                          </p:val>
+                                        </p:tav>
+                                      </p:tavLst>
+                                    </p:anim>
+                                    <p:anim calcmode="lin" valueType="num">
+                                      <p:cBhvr>
+                                        <p:cTn id="30" dur="1000" fill="hold"/>
+                                        <p:tgtEl>
+                                          <p:spTgt spid="4">
+                                            <p:txEl>
+                                              <p:pRg st="0" end="0"/>
+                                            </p:txEl>
+                                          </p:spTgt>
+                                        </p:tgtEl>
+                                        <p:attrNameLst>
+                                          <p:attrName>ppt_y</p:attrName>
+                                        </p:attrNameLst>
+                                      </p:cBhvr>
+                                      <p:tavLst>
+                                        <p:tav tm="0">
+                                          <p:val>
+                                            <p:strVal val="#ppt_y+.1"/>
+                                          </p:val>
+                                        </p:tav>
+                                        <p:tav tm="100000">
+                                          <p:val>
+                                            <p:strVal val="#ppt_y"/>
+                                          </p:val>
+                                        </p:tav>
+                                      </p:tavLst>
+                                    </p:anim>
+                                  </p:childTnLst>
+                                </p:cTn>
+                              </p:par>
+                            </p:childTnLst>
+                          </p:cTn>
+                        </p:par>
+                      </p:childTnLst>
+                    </p:cTn>
+                  </p:par>
+                  <p:par>
+                    <p:cTn id="31" fill="hold">
+                      <p:stCondLst>
+                        <p:cond delay="indefinite"/>
+                      </p:stCondLst>
+                      <p:childTnLst>
+                        <p:par>
+                          <p:cTn id="32" fill="hold">
+                            <p:stCondLst>
+                              <p:cond delay="0"/>
+                            </p:stCondLst>
+                            <p:childTnLst>
+                              <p:par>
+                                <p:cTn id="33" presetID="42" presetClass="entr" presetSubtype="0" fill="hold" nodeType="clickEffect">
+                                  <p:stCondLst>
+                                    <p:cond delay="0"/>
+                                  </p:stCondLst>
+                                  <p:childTnLst>
+                                    <p:set>
+                                      <p:cBhvr>
+                                        <p:cTn id="34" dur="1" fill="hold">
+                                          <p:stCondLst>
+                                            <p:cond delay="0"/>
+                                          </p:stCondLst>
+                                        </p:cTn>
+                                        <p:tgtEl>
+                                          <p:spTgt spid="4">
+                                            <p:txEl>
+                                              <p:pRg st="1" end="1"/>
+                                            </p:txEl>
+                                          </p:spTgt>
+                                        </p:tgtEl>
+                                        <p:attrNameLst>
+                                          <p:attrName>style.visibility</p:attrName>
+                                        </p:attrNameLst>
+                                      </p:cBhvr>
+                                      <p:to>
+                                        <p:strVal val="visible"/>
+                                      </p:to>
+                                    </p:set>
+                                    <p:animEffect transition="in" filter="fade">
+                                      <p:cBhvr>
+                                        <p:cTn id="35" dur="1000"/>
+                                        <p:tgtEl>
+                                          <p:spTgt spid="4">
+                                            <p:txEl>
+                                              <p:pRg st="1" end="1"/>
+                                            </p:txEl>
+                                          </p:spTgt>
+                                        </p:tgtEl>
+                                      </p:cBhvr>
+                                    </p:animEffect>
+                                    <p:anim calcmode="lin" valueType="num">
+                                      <p:cBhvr>
+                                        <p:cTn id="36" dur="1000" fill="hold"/>
+                                        <p:tgtEl>
+                                          <p:spTgt spid="4">
+                                            <p:txEl>
+                                              <p:pRg st="1" end="1"/>
+                                            </p:txEl>
+                                          </p:spTgt>
+                                        </p:tgtEl>
+                                        <p:attrNameLst>
+                                          <p:attrName>ppt_x</p:attrName>
+                                        </p:attrNameLst>
+                                      </p:cBhvr>
+                                      <p:tavLst>
+                                        <p:tav tm="0">
+                                          <p:val>
+                                            <p:strVal val="#ppt_x"/>
+                                          </p:val>
+                                        </p:tav>
+                                        <p:tav tm="100000">
+                                          <p:val>
+                                            <p:strVal val="#ppt_x"/>
+                                          </p:val>
+                                        </p:tav>
+                                      </p:tavLst>
+                                    </p:anim>
+                                    <p:anim calcmode="lin" valueType="num">
+                                      <p:cBhvr>
+                                        <p:cTn id="37" dur="1000" fill="hold"/>
+                                        <p:tgtEl>
+                                          <p:spTgt spid="4">
+                                            <p:txEl>
+                                              <p:pRg st="1" end="1"/>
+                                            </p:txEl>
+                                          </p:spTgt>
+                                        </p:tgtEl>
+                                        <p:attrNameLst>
+                                          <p:attrName>ppt_y</p:attrName>
+                                        </p:attrNameLst>
+                                      </p:cBhvr>
+                                      <p:tavLst>
+                                        <p:tav tm="0">
+                                          <p:val>
+                                            <p:strVal val="#ppt_y+.1"/>
+                                          </p:val>
+                                        </p:tav>
+                                        <p:tav tm="100000">
+                                          <p:val>
+                                            <p:strVal val="#ppt_y"/>
+                                          </p:val>
+                                        </p:tav>
+                                      </p:tavLst>
+                                    </p:anim>
+                                  </p:childTnLst>
+                                </p:cTn>
+                              </p:par>
+                            </p:childTnLst>
+                          </p:cTn>
+                        </p:par>
+                      </p:childTnLst>
+                    </p:cTn>
+                  </p:par>
+                </p:childTnLst>
+              </p:cTn>
+              <p:prevCondLst>
+                <p:cond evt="onPrev" delay="0">
+                  <p:tgtEl>
+                    <p:sldTgt/>
+                  </p:tgtEl>
+                </p:cond>
+              </p:prevCondLst>
+              <p:nextCondLst>
+                <p:cond evt="onNext" delay="0">
+                  <p:tgtEl>
+                    <p:sldTgt/>
+                  </p:tgtEl>
+                </p:cond>
+              </p:nextCondLst>
+            </p:seq>
+          </p:childTnLst>
+        </p:cTn>
+      </p:par>
+    </p:tnLst>
+    <p:bldLst>
+      <p:bldP spid="3" grpId="0" build="p"/>
+    </p:bldLst>
   </p:timing>
 </p:sld>
 </file>
@@ -9083,7 +11850,19 @@
           <a:p>
             <a:r>
               <a:rPr lang="en-US" dirty="0" smtClean="0"/>
-              <a:t>Event-based Asynchronous Pattern (EAP)- </a:t>
+              <a:t>Event-based Asynchronous </a:t>
+            </a:r>
+            <a:r>
+              <a:rPr lang="en-US" dirty="0" smtClean="0"/>
+              <a:t>Programming</a:t>
+            </a:r>
+            <a:r>
+              <a:rPr lang="en-US" dirty="0" smtClean="0"/>
+              <a:t>(EAP</a:t>
+            </a:r>
+            <a:r>
+              <a:rPr lang="en-US" dirty="0" smtClean="0"/>
+              <a:t>)- </a:t>
             </a:r>
             <a:r>
               <a:rPr lang="ru-RU" dirty="0" smtClean="0"/>

</xml_diff>